<commit_message>
document of my assigment of 6001 on 13/12/2022 08h18
</commit_message>
<xml_diff>
--- a/Research methodology/Learning Unit 4 Sampling Techniques and Sample Size - Copy.pptx
+++ b/Research methodology/Learning Unit 4 Sampling Techniques and Sample Size - Copy.pptx
@@ -223,7 +223,7 @@
           <a:p>
             <a:fld id="{9038C21B-F673-44E7-B590-B51DE1E9859D}" type="datetimeFigureOut">
               <a:rPr lang="en-ZA" smtClean="0"/>
-              <a:t>2022/12/04</a:t>
+              <a:t>2022/12/11</a:t>
             </a:fld>
             <a:endParaRPr lang="en-ZA"/>
           </a:p>
@@ -861,7 +861,7 @@
                 <a:spcPct val="0"/>
               </a:spcBef>
             </a:pPr>
-            <a:endParaRPr lang="en-US" altLang="en-US"/>
+            <a:endParaRPr lang="en-US" altLang="en-US" dirty="0"/>
           </a:p>
         </p:txBody>
       </p:sp>
@@ -1009,7 +1009,7 @@
               <a:pPr/>
               <a:t>11</a:t>
             </a:fld>
-            <a:endParaRPr lang="en-US" altLang="en-US" sz="1200"/>
+            <a:endParaRPr lang="en-US" altLang="en-US" sz="1200" dirty="0"/>
           </a:p>
         </p:txBody>
       </p:sp>
@@ -1131,7 +1131,7 @@
                 <a:spcPct val="0"/>
               </a:spcBef>
             </a:pPr>
-            <a:endParaRPr lang="en-US" altLang="en-US"/>
+            <a:endParaRPr lang="en-US" altLang="en-US" dirty="0"/>
           </a:p>
         </p:txBody>
       </p:sp>
@@ -1279,7 +1279,7 @@
               <a:pPr/>
               <a:t>12</a:t>
             </a:fld>
-            <a:endParaRPr lang="en-US" altLang="en-US" sz="1200"/>
+            <a:endParaRPr lang="en-US" altLang="en-US" sz="1200" dirty="0"/>
           </a:p>
         </p:txBody>
       </p:sp>
@@ -1401,7 +1401,7 @@
                 <a:spcPct val="0"/>
               </a:spcBef>
             </a:pPr>
-            <a:endParaRPr lang="en-US" altLang="en-US"/>
+            <a:endParaRPr lang="en-US" altLang="en-US" dirty="0"/>
           </a:p>
         </p:txBody>
       </p:sp>
@@ -1549,7 +1549,7 @@
               <a:pPr/>
               <a:t>13</a:t>
             </a:fld>
-            <a:endParaRPr lang="en-US" altLang="en-US" sz="1200"/>
+            <a:endParaRPr lang="en-US" altLang="en-US" sz="1200" dirty="0"/>
           </a:p>
         </p:txBody>
       </p:sp>
@@ -1671,7 +1671,7 @@
                 <a:spcPct val="0"/>
               </a:spcBef>
             </a:pPr>
-            <a:endParaRPr lang="en-US" altLang="en-US"/>
+            <a:endParaRPr lang="en-US" altLang="en-US" dirty="0"/>
           </a:p>
         </p:txBody>
       </p:sp>
@@ -1819,7 +1819,7 @@
               <a:pPr/>
               <a:t>14</a:t>
             </a:fld>
-            <a:endParaRPr lang="en-US" altLang="en-US" sz="1200"/>
+            <a:endParaRPr lang="en-US" altLang="en-US" sz="1200" dirty="0"/>
           </a:p>
         </p:txBody>
       </p:sp>
@@ -1941,7 +1941,7 @@
                 <a:spcPct val="0"/>
               </a:spcBef>
             </a:pPr>
-            <a:endParaRPr lang="en-US" altLang="en-US"/>
+            <a:endParaRPr lang="en-US" altLang="en-US" dirty="0"/>
           </a:p>
         </p:txBody>
       </p:sp>
@@ -2089,7 +2089,7 @@
               <a:pPr/>
               <a:t>15</a:t>
             </a:fld>
-            <a:endParaRPr lang="en-US" altLang="en-US" sz="1200"/>
+            <a:endParaRPr lang="en-US" altLang="en-US" sz="1200" dirty="0"/>
           </a:p>
         </p:txBody>
       </p:sp>
@@ -2211,7 +2211,7 @@
                 <a:spcPct val="0"/>
               </a:spcBef>
             </a:pPr>
-            <a:endParaRPr lang="en-US" altLang="en-US"/>
+            <a:endParaRPr lang="en-US" altLang="en-US" dirty="0"/>
           </a:p>
         </p:txBody>
       </p:sp>
@@ -2359,7 +2359,7 @@
               <a:pPr/>
               <a:t>16</a:t>
             </a:fld>
-            <a:endParaRPr lang="en-US" altLang="en-US" sz="1200"/>
+            <a:endParaRPr lang="en-US" altLang="en-US" sz="1200" dirty="0"/>
           </a:p>
         </p:txBody>
       </p:sp>
@@ -2481,7 +2481,7 @@
                 <a:spcPct val="0"/>
               </a:spcBef>
             </a:pPr>
-            <a:endParaRPr lang="en-US" altLang="en-US"/>
+            <a:endParaRPr lang="en-US" altLang="en-US" dirty="0"/>
           </a:p>
         </p:txBody>
       </p:sp>
@@ -2629,7 +2629,7 @@
               <a:pPr/>
               <a:t>17</a:t>
             </a:fld>
-            <a:endParaRPr lang="en-US" altLang="en-US" sz="1200"/>
+            <a:endParaRPr lang="en-US" altLang="en-US" sz="1200" dirty="0"/>
           </a:p>
         </p:txBody>
       </p:sp>
@@ -2751,7 +2751,7 @@
                 <a:spcPct val="0"/>
               </a:spcBef>
             </a:pPr>
-            <a:endParaRPr lang="en-US" altLang="en-US"/>
+            <a:endParaRPr lang="en-US" altLang="en-US" dirty="0"/>
           </a:p>
         </p:txBody>
       </p:sp>
@@ -2899,7 +2899,7 @@
               <a:pPr/>
               <a:t>18</a:t>
             </a:fld>
-            <a:endParaRPr lang="en-US" altLang="en-US" sz="1200"/>
+            <a:endParaRPr lang="en-US" altLang="en-US" sz="1200" dirty="0"/>
           </a:p>
         </p:txBody>
       </p:sp>
@@ -3021,7 +3021,7 @@
                 <a:spcPct val="0"/>
               </a:spcBef>
             </a:pPr>
-            <a:endParaRPr lang="en-US" altLang="en-US"/>
+            <a:endParaRPr lang="en-US" altLang="en-US" dirty="0"/>
           </a:p>
         </p:txBody>
       </p:sp>
@@ -3169,7 +3169,7 @@
               <a:pPr/>
               <a:t>19</a:t>
             </a:fld>
-            <a:endParaRPr lang="en-US" altLang="en-US" sz="1200"/>
+            <a:endParaRPr lang="en-US" altLang="en-US" sz="1200" dirty="0"/>
           </a:p>
         </p:txBody>
       </p:sp>
@@ -3291,7 +3291,7 @@
                 <a:spcPct val="0"/>
               </a:spcBef>
             </a:pPr>
-            <a:endParaRPr lang="en-US" altLang="en-US"/>
+            <a:endParaRPr lang="en-US" altLang="en-US" dirty="0"/>
           </a:p>
         </p:txBody>
       </p:sp>
@@ -3439,7 +3439,7 @@
               <a:pPr/>
               <a:t>20</a:t>
             </a:fld>
-            <a:endParaRPr lang="en-US" altLang="en-US" sz="1200"/>
+            <a:endParaRPr lang="en-US" altLang="en-US" sz="1200" dirty="0"/>
           </a:p>
         </p:txBody>
       </p:sp>
@@ -3831,7 +3831,7 @@
                 <a:spcPct val="0"/>
               </a:spcBef>
             </a:pPr>
-            <a:endParaRPr lang="en-US" altLang="en-US"/>
+            <a:endParaRPr lang="en-US" altLang="en-US" dirty="0"/>
           </a:p>
         </p:txBody>
       </p:sp>
@@ -3979,7 +3979,7 @@
               <a:pPr/>
               <a:t>21</a:t>
             </a:fld>
-            <a:endParaRPr lang="en-US" altLang="en-US" sz="1200"/>
+            <a:endParaRPr lang="en-US" altLang="en-US" sz="1200" dirty="0"/>
           </a:p>
         </p:txBody>
       </p:sp>
@@ -4101,7 +4101,7 @@
                 <a:spcPct val="0"/>
               </a:spcBef>
             </a:pPr>
-            <a:endParaRPr lang="en-US" altLang="en-US"/>
+            <a:endParaRPr lang="en-US" altLang="en-US" dirty="0"/>
           </a:p>
         </p:txBody>
       </p:sp>
@@ -4249,7 +4249,7 @@
               <a:pPr/>
               <a:t>22</a:t>
             </a:fld>
-            <a:endParaRPr lang="en-US" altLang="en-US" sz="1200"/>
+            <a:endParaRPr lang="en-US" altLang="en-US" sz="1200" dirty="0"/>
           </a:p>
         </p:txBody>
       </p:sp>
@@ -7655,7 +7655,7 @@
           <a:p>
             <a:fld id="{0AE94414-238F-4CA9-8CDD-F66CD4ADEBDB}" type="datetimeFigureOut">
               <a:rPr lang="en-ZA" smtClean="0"/>
-              <a:t>2022/12/04</a:t>
+              <a:t>2022/12/11</a:t>
             </a:fld>
             <a:endParaRPr lang="en-ZA"/>
           </a:p>
@@ -7855,7 +7855,7 @@
           <a:p>
             <a:fld id="{0AE94414-238F-4CA9-8CDD-F66CD4ADEBDB}" type="datetimeFigureOut">
               <a:rPr lang="en-ZA" smtClean="0"/>
-              <a:t>2022/12/04</a:t>
+              <a:t>2022/12/11</a:t>
             </a:fld>
             <a:endParaRPr lang="en-ZA"/>
           </a:p>
@@ -8065,7 +8065,7 @@
           <a:p>
             <a:fld id="{0AE94414-238F-4CA9-8CDD-F66CD4ADEBDB}" type="datetimeFigureOut">
               <a:rPr lang="en-ZA" smtClean="0"/>
-              <a:t>2022/12/04</a:t>
+              <a:t>2022/12/11</a:t>
             </a:fld>
             <a:endParaRPr lang="en-ZA"/>
           </a:p>
@@ -8265,7 +8265,7 @@
           <a:p>
             <a:fld id="{0AE94414-238F-4CA9-8CDD-F66CD4ADEBDB}" type="datetimeFigureOut">
               <a:rPr lang="en-ZA" smtClean="0"/>
-              <a:t>2022/12/04</a:t>
+              <a:t>2022/12/11</a:t>
             </a:fld>
             <a:endParaRPr lang="en-ZA"/>
           </a:p>
@@ -8541,7 +8541,7 @@
           <a:p>
             <a:fld id="{0AE94414-238F-4CA9-8CDD-F66CD4ADEBDB}" type="datetimeFigureOut">
               <a:rPr lang="en-ZA" smtClean="0"/>
-              <a:t>2022/12/04</a:t>
+              <a:t>2022/12/11</a:t>
             </a:fld>
             <a:endParaRPr lang="en-ZA"/>
           </a:p>
@@ -8809,7 +8809,7 @@
           <a:p>
             <a:fld id="{0AE94414-238F-4CA9-8CDD-F66CD4ADEBDB}" type="datetimeFigureOut">
               <a:rPr lang="en-ZA" smtClean="0"/>
-              <a:t>2022/12/04</a:t>
+              <a:t>2022/12/11</a:t>
             </a:fld>
             <a:endParaRPr lang="en-ZA"/>
           </a:p>
@@ -9224,7 +9224,7 @@
           <a:p>
             <a:fld id="{0AE94414-238F-4CA9-8CDD-F66CD4ADEBDB}" type="datetimeFigureOut">
               <a:rPr lang="en-ZA" smtClean="0"/>
-              <a:t>2022/12/04</a:t>
+              <a:t>2022/12/11</a:t>
             </a:fld>
             <a:endParaRPr lang="en-ZA"/>
           </a:p>
@@ -9366,7 +9366,7 @@
           <a:p>
             <a:fld id="{0AE94414-238F-4CA9-8CDD-F66CD4ADEBDB}" type="datetimeFigureOut">
               <a:rPr lang="en-ZA" smtClean="0"/>
-              <a:t>2022/12/04</a:t>
+              <a:t>2022/12/11</a:t>
             </a:fld>
             <a:endParaRPr lang="en-ZA"/>
           </a:p>
@@ -9479,7 +9479,7 @@
           <a:p>
             <a:fld id="{0AE94414-238F-4CA9-8CDD-F66CD4ADEBDB}" type="datetimeFigureOut">
               <a:rPr lang="en-ZA" smtClean="0"/>
-              <a:t>2022/12/04</a:t>
+              <a:t>2022/12/11</a:t>
             </a:fld>
             <a:endParaRPr lang="en-ZA"/>
           </a:p>
@@ -9792,7 +9792,7 @@
           <a:p>
             <a:fld id="{0AE94414-238F-4CA9-8CDD-F66CD4ADEBDB}" type="datetimeFigureOut">
               <a:rPr lang="en-ZA" smtClean="0"/>
-              <a:t>2022/12/04</a:t>
+              <a:t>2022/12/11</a:t>
             </a:fld>
             <a:endParaRPr lang="en-ZA"/>
           </a:p>
@@ -10081,7 +10081,7 @@
           <a:p>
             <a:fld id="{0AE94414-238F-4CA9-8CDD-F66CD4ADEBDB}" type="datetimeFigureOut">
               <a:rPr lang="en-ZA" smtClean="0"/>
-              <a:t>2022/12/04</a:t>
+              <a:t>2022/12/11</a:t>
             </a:fld>
             <a:endParaRPr lang="en-ZA"/>
           </a:p>
@@ -10324,7 +10324,7 @@
           <a:p>
             <a:fld id="{0AE94414-238F-4CA9-8CDD-F66CD4ADEBDB}" type="datetimeFigureOut">
               <a:rPr lang="en-ZA" smtClean="0"/>
-              <a:t>2022/12/04</a:t>
+              <a:t>2022/12/11</a:t>
             </a:fld>
             <a:endParaRPr lang="en-ZA"/>
           </a:p>
@@ -10773,22 +10773,9 @@
           </a:p>
           <a:p>
             <a:r>
-              <a:rPr lang="en-ZA" sz="3200" b="1" dirty="0" smtClean="0"/>
-              <a:t>Learning Unit 4: Sampling </a:t>
-            </a:r>
-            <a:r>
-              <a:rPr lang="en-ZA" sz="3200" b="1" dirty="0" smtClean="0"/>
-              <a:t>Techniques </a:t>
-            </a:r>
-            <a:r>
-              <a:rPr lang="en-ZA" sz="3200" b="1" dirty="0" smtClean="0"/>
-              <a:t>and </a:t>
-            </a:r>
-            <a:r>
-              <a:rPr lang="en-ZA" sz="3200" b="1" dirty="0" smtClean="0"/>
-              <a:t>Sample Size</a:t>
-            </a:r>
-            <a:endParaRPr lang="en-ZA" sz="3200" b="1" dirty="0"/>
+              <a:rPr lang="en-ZA" sz="3200" b="1" dirty="0"/>
+              <a:t>Learning Unit 4: Sampling Techniques and Sample Size</a:t>
+            </a:r>
           </a:p>
         </p:txBody>
       </p:sp>
@@ -10838,7 +10825,7 @@
         </p:nvSpPr>
         <p:spPr>
           <a:xfrm>
-            <a:off x="1348365" y="2057683"/>
+            <a:off x="1348365" y="2048608"/>
             <a:ext cx="9935829" cy="2760783"/>
           </a:xfrm>
           <a:prstGeom prst="rect">
@@ -10870,7 +10857,7 @@
           </a:lstStyle>
           <a:p>
             <a:r>
-              <a:rPr lang="en-ZA" sz="3600" b="1" dirty="0" smtClean="0">
+              <a:rPr lang="en-ZA" sz="3600" b="1" dirty="0">
                 <a:solidFill>
                   <a:srgbClr val="0070C0"/>
                 </a:solidFill>
@@ -10887,37 +10874,19 @@
                 </a:solidFill>
                 <a:latin typeface="+mn-lt"/>
               </a:rPr>
-              <a:t> </a:t>
-            </a:r>
-            <a:r>
-              <a:rPr lang="en-ZA" sz="3600" b="1" dirty="0" smtClean="0">
+              <a:t>                Communication</a:t>
+            </a:r>
+          </a:p>
+          <a:p>
+            <a:pPr algn="l"/>
+            <a:r>
+              <a:rPr lang="en-ZA" sz="3600" b="1" dirty="0">
                 <a:solidFill>
                   <a:srgbClr val="0070C0"/>
                 </a:solidFill>
                 <a:latin typeface="+mn-lt"/>
               </a:rPr>
-              <a:t>               Communication</a:t>
-            </a:r>
-          </a:p>
-          <a:p>
-            <a:pPr algn="l"/>
-            <a:r>
-              <a:rPr lang="en-ZA" sz="3600" b="1" dirty="0">
-                <a:solidFill>
-                  <a:srgbClr val="0070C0"/>
-                </a:solidFill>
-                <a:latin typeface="+mn-lt"/>
-              </a:rPr>
-              <a:t> </a:t>
-            </a:r>
-            <a:r>
-              <a:rPr lang="en-ZA" sz="3600" b="1" dirty="0" smtClean="0">
-                <a:solidFill>
-                  <a:srgbClr val="0070C0"/>
-                </a:solidFill>
-                <a:latin typeface="+mn-lt"/>
-              </a:rPr>
-              <a:t>              Course Code: 6001</a:t>
+              <a:t>               Course Code: 6001</a:t>
             </a:r>
             <a:endParaRPr lang="en-ZA" sz="3600" b="1" dirty="0">
               <a:solidFill>
@@ -10928,22 +10897,13 @@
           </a:p>
           <a:p>
             <a:r>
-              <a:rPr lang="en-ZA" sz="3600" b="1" dirty="0" smtClean="0">
+              <a:rPr lang="en-ZA" sz="3600" b="1" dirty="0">
                 <a:solidFill>
                   <a:srgbClr val="C00000"/>
                 </a:solidFill>
                 <a:latin typeface="+mn-lt"/>
               </a:rPr>
-              <a:t>(</a:t>
-            </a:r>
-            <a:r>
-              <a:rPr lang="en-ZA" sz="3600" b="1" dirty="0">
-                <a:solidFill>
-                  <a:srgbClr val="C00000"/>
-                </a:solidFill>
-                <a:latin typeface="+mn-lt"/>
-              </a:rPr>
-              <a:t>Lecturer: Elizabeth </a:t>
+              <a:t>(Lecturer: Elizabeth </a:t>
             </a:r>
             <a:r>
               <a:rPr lang="en-ZA" sz="3600" b="1" dirty="0" err="1">
@@ -10961,16 +10921,7 @@
                 </a:solidFill>
                 <a:latin typeface="+mn-lt"/>
               </a:rPr>
-              <a:t>, PhD</a:t>
-            </a:r>
-            <a:r>
-              <a:rPr lang="en-ZA" sz="3600" b="1" dirty="0" smtClean="0">
-                <a:solidFill>
-                  <a:srgbClr val="C00000"/>
-                </a:solidFill>
-                <a:latin typeface="+mn-lt"/>
-              </a:rPr>
-              <a:t>)</a:t>
+              <a:t>, PhD)</a:t>
             </a:r>
             <a:endParaRPr lang="en-ZA" sz="3600" b="1" dirty="0">
               <a:solidFill>
@@ -11028,14 +10979,6 @@
             </a:lvl1pPr>
           </a:lstStyle>
           <a:p>
-            <a:r>
-              <a:rPr lang="en-ZA" sz="3600" b="1" dirty="0">
-                <a:solidFill>
-                  <a:srgbClr val="C00000"/>
-                </a:solidFill>
-              </a:rPr>
-              <a:t/>
-            </a:r>
             <a:br>
               <a:rPr lang="en-ZA" sz="3600" b="1" dirty="0">
                 <a:solidFill>
@@ -11052,7 +10995,7 @@
               <a:t> </a:t>
             </a:r>
             <a:r>
-              <a:rPr lang="en-ZA" sz="4600" b="1" dirty="0" smtClean="0">
+              <a:rPr lang="en-ZA" sz="4600" b="1" dirty="0">
                 <a:solidFill>
                   <a:srgbClr val="C00000"/>
                 </a:solidFill>
@@ -11060,12 +11003,6 @@
               </a:rPr>
               <a:t>The Nelson Mandela African Institution of Science and Technology</a:t>
             </a:r>
-            <a:endParaRPr lang="en-ZA" sz="4600" b="1" dirty="0">
-              <a:solidFill>
-                <a:srgbClr val="C00000"/>
-              </a:solidFill>
-              <a:latin typeface="+mn-lt"/>
-            </a:endParaRPr>
           </a:p>
         </p:txBody>
       </p:sp>
@@ -11079,13 +11016,6 @@
   <p:clrMapOvr>
     <a:masterClrMapping/>
   </p:clrMapOvr>
-  <p:timing>
-    <p:tnLst>
-      <p:par>
-        <p:cTn id="1" dur="indefinite" restart="never" nodeType="tmRoot"/>
-      </p:par>
-    </p:tnLst>
-  </p:timing>
 </p:sld>
 </file>
 
@@ -11144,27 +11074,8 @@
                 <a:ea typeface="+mn-ea"/>
                 <a:cs typeface="+mn-cs"/>
               </a:rPr>
-              <a:t>3</a:t>
-            </a:r>
-            <a:r>
-              <a:rPr lang="en-ZA" altLang="en-US" sz="3600" b="1" dirty="0" smtClean="0">
-                <a:solidFill>
-                  <a:srgbClr val="0070C0"/>
-                </a:solidFill>
-                <a:latin typeface="+mn-lt"/>
-                <a:ea typeface="+mn-ea"/>
-                <a:cs typeface="+mn-cs"/>
-              </a:rPr>
-              <a:t>. Sampling Terminology</a:t>
-            </a:r>
-            <a:endParaRPr lang="en-ZA" altLang="en-US" sz="3600" b="1" dirty="0">
-              <a:solidFill>
-                <a:srgbClr val="0070C0"/>
-              </a:solidFill>
-              <a:latin typeface="+mn-lt"/>
-              <a:ea typeface="+mn-ea"/>
-              <a:cs typeface="+mn-cs"/>
-            </a:endParaRPr>
+              <a:t>3. Sampling Terminology</a:t>
+            </a:r>
           </a:p>
         </p:txBody>
       </p:sp>
@@ -11202,20 +11113,20 @@
               </a:lnSpc>
             </a:pPr>
             <a:r>
-              <a:rPr lang="en-US" sz="3600" dirty="0" smtClean="0"/>
-              <a:t>Consider </a:t>
-            </a:r>
-            <a:r>
               <a:rPr lang="en-US" sz="3600" dirty="0"/>
-              <a:t>the examples </a:t>
-            </a:r>
-            <a:r>
-              <a:rPr lang="en-US" sz="3600" dirty="0" smtClean="0"/>
-              <a:t>to </a:t>
+              <a:t>Consider the examples to find out the </a:t>
+            </a:r>
+            <a:r>
+              <a:rPr lang="en-US" sz="3600" dirty="0">
+                <a:solidFill>
+                  <a:srgbClr val="C00000"/>
+                </a:solidFill>
+              </a:rPr>
+              <a:t>average age of the class</a:t>
             </a:r>
             <a:r>
               <a:rPr lang="en-US" sz="3600" dirty="0"/>
-              <a:t>find out the </a:t>
+              <a:t> and </a:t>
             </a:r>
             <a:r>
               <a:rPr lang="en-US" sz="3600" dirty="0">
@@ -11223,43 +11134,7 @@
                   <a:srgbClr val="C00000"/>
                 </a:solidFill>
               </a:rPr>
-              <a:t>average age of the </a:t>
-            </a:r>
-            <a:r>
-              <a:rPr lang="en-US" sz="3600" dirty="0" smtClean="0">
-                <a:solidFill>
-                  <a:srgbClr val="C00000"/>
-                </a:solidFill>
-              </a:rPr>
-              <a:t>class</a:t>
-            </a:r>
-            <a:r>
-              <a:rPr lang="en-US" sz="3600" dirty="0" smtClean="0"/>
-              <a:t> and </a:t>
-            </a:r>
-            <a:r>
-              <a:rPr lang="en-US" sz="3600" dirty="0" smtClean="0">
-                <a:solidFill>
-                  <a:srgbClr val="C00000"/>
-                </a:solidFill>
-              </a:rPr>
-              <a:t>the </a:t>
-            </a:r>
-            <a:r>
-              <a:rPr lang="en-US" sz="3600" dirty="0">
-                <a:solidFill>
-                  <a:srgbClr val="C00000"/>
-                </a:solidFill>
-              </a:rPr>
-              <a:t>average income of the families living in the </a:t>
-            </a:r>
-            <a:r>
-              <a:rPr lang="en-US" sz="3600" dirty="0" smtClean="0">
-                <a:solidFill>
-                  <a:srgbClr val="C00000"/>
-                </a:solidFill>
-              </a:rPr>
-              <a:t>city.</a:t>
+              <a:t>the average income of the families living in the city.</a:t>
             </a:r>
           </a:p>
           <a:p>
@@ -11270,23 +11145,7 @@
             </a:pPr>
             <a:r>
               <a:rPr lang="en-US" sz="3600" dirty="0"/>
-              <a:t>The class, families living in the city </a:t>
-            </a:r>
-            <a:r>
-              <a:rPr lang="en-US" sz="3600" dirty="0" smtClean="0"/>
-              <a:t>from </a:t>
-            </a:r>
-            <a:r>
-              <a:rPr lang="en-US" sz="3600" dirty="0"/>
-              <a:t>which you select </a:t>
-            </a:r>
-            <a:r>
-              <a:rPr lang="en-US" sz="3600" dirty="0" smtClean="0"/>
-              <a:t>your </a:t>
-            </a:r>
-            <a:r>
-              <a:rPr lang="en-US" sz="3600" dirty="0"/>
-              <a:t>sample are called</a:t>
+              <a:t>The class, families living in the city from which you select your sample are called</a:t>
             </a:r>
             <a:r>
               <a:rPr lang="en-US" sz="3600" b="1" dirty="0">
@@ -11322,11 +11181,7 @@
             </a:r>
             <a:r>
               <a:rPr lang="en-US" sz="3600" dirty="0"/>
-              <a:t>. </a:t>
-            </a:r>
-            <a:r>
-              <a:rPr lang="en-US" sz="3600" dirty="0" smtClean="0"/>
-              <a:t> </a:t>
+              <a:t>.  </a:t>
             </a:r>
           </a:p>
           <a:p>
@@ -11337,19 +11192,7 @@
             </a:pPr>
             <a:r>
               <a:rPr lang="en-US" sz="3600" dirty="0"/>
-              <a:t>The </a:t>
-            </a:r>
-            <a:r>
-              <a:rPr lang="en-US" sz="3600" dirty="0"/>
-              <a:t>small group of students, families </a:t>
-            </a:r>
-            <a:r>
-              <a:rPr lang="en-US" sz="3600" dirty="0" smtClean="0"/>
-              <a:t>from </a:t>
-            </a:r>
-            <a:r>
-              <a:rPr lang="en-US" sz="3600" dirty="0"/>
-              <a:t>whom you </a:t>
+              <a:t>The small group of students, families from whom you </a:t>
             </a:r>
             <a:r>
               <a:rPr lang="en-US" sz="3600" dirty="0">
@@ -11361,15 +11204,7 @@
             </a:r>
             <a:r>
               <a:rPr lang="en-US" sz="3600" dirty="0"/>
-              <a:t> </a:t>
-            </a:r>
-            <a:r>
-              <a:rPr lang="en-US" sz="3600" dirty="0" smtClean="0"/>
-              <a:t>is </a:t>
-            </a:r>
-            <a:r>
-              <a:rPr lang="en-US" sz="3600" dirty="0"/>
-              <a:t>called </a:t>
+              <a:t> is called </a:t>
             </a:r>
             <a:r>
               <a:rPr lang="en-US" sz="3600" b="1" dirty="0">
@@ -11377,18 +11212,10 @@
                   <a:srgbClr val="C00000"/>
                 </a:solidFill>
               </a:rPr>
-              <a:t>the </a:t>
-            </a:r>
-            <a:r>
-              <a:rPr lang="en-US" sz="3600" b="1" dirty="0" smtClean="0">
-                <a:solidFill>
-                  <a:srgbClr val="C00000"/>
-                </a:solidFill>
-              </a:rPr>
-              <a:t>sample</a:t>
-            </a:r>
-            <a:r>
-              <a:rPr lang="en-US" sz="3600" dirty="0" smtClean="0">
+              <a:t>the sample</a:t>
+            </a:r>
+            <a:r>
+              <a:rPr lang="en-US" sz="3600" dirty="0">
                 <a:solidFill>
                   <a:srgbClr val="C00000"/>
                 </a:solidFill>
@@ -11413,13 +11240,6 @@
   <p:clrMapOvr>
     <a:masterClrMapping/>
   </p:clrMapOvr>
-  <p:timing>
-    <p:tnLst>
-      <p:par>
-        <p:cTn id="1" dur="indefinite" restart="never" nodeType="tmRoot"/>
-      </p:par>
-    </p:tnLst>
-  </p:timing>
 </p:sld>
 </file>
 
@@ -11478,27 +11298,8 @@
                 <a:ea typeface="+mn-ea"/>
                 <a:cs typeface="+mn-cs"/>
               </a:rPr>
-              <a:t>3</a:t>
-            </a:r>
-            <a:r>
-              <a:rPr lang="en-ZA" altLang="en-US" sz="3600" b="1" dirty="0" smtClean="0">
-                <a:solidFill>
-                  <a:srgbClr val="0070C0"/>
-                </a:solidFill>
-                <a:latin typeface="+mn-lt"/>
-                <a:ea typeface="+mn-ea"/>
-                <a:cs typeface="+mn-cs"/>
-              </a:rPr>
-              <a:t>. Sampling Terminology…</a:t>
-            </a:r>
-            <a:endParaRPr lang="en-ZA" altLang="en-US" sz="3600" b="1" dirty="0">
-              <a:solidFill>
-                <a:srgbClr val="0070C0"/>
-              </a:solidFill>
-              <a:latin typeface="+mn-lt"/>
-              <a:ea typeface="+mn-ea"/>
-              <a:cs typeface="+mn-cs"/>
-            </a:endParaRPr>
+              <a:t>3. Sampling Terminology…</a:t>
+            </a:r>
           </a:p>
         </p:txBody>
       </p:sp>
@@ -11536,7 +11337,7 @@
               </a:lnSpc>
             </a:pPr>
             <a:r>
-              <a:rPr lang="en-US" sz="3600" dirty="0" smtClean="0"/>
+              <a:rPr lang="en-US" sz="3600" dirty="0"/>
               <a:t>The </a:t>
             </a:r>
             <a:r>
@@ -11548,12 +11349,8 @@
               <a:t>number of students, families </a:t>
             </a:r>
             <a:r>
-              <a:rPr lang="en-US" sz="3600" dirty="0" smtClean="0"/>
-              <a:t>from </a:t>
-            </a:r>
-            <a:r>
               <a:rPr lang="en-US" sz="3600" dirty="0"/>
-              <a:t>whom you obtain the required information is called the </a:t>
+              <a:t>from whom you obtain the required information is called the </a:t>
             </a:r>
             <a:r>
               <a:rPr lang="en-US" sz="3600" b="1" dirty="0">
@@ -11576,7 +11373,7 @@
               <a:t>n</a:t>
             </a:r>
             <a:r>
-              <a:rPr lang="en-US" sz="3600" dirty="0" smtClean="0"/>
+              <a:rPr lang="en-US" sz="3600" dirty="0"/>
               <a:t>.</a:t>
             </a:r>
           </a:p>
@@ -11599,12 +11396,8 @@
               <a:t>way you select students, families </a:t>
             </a:r>
             <a:r>
-              <a:rPr lang="en-US" sz="3600" dirty="0" smtClean="0"/>
-              <a:t>is </a:t>
-            </a:r>
-            <a:r>
               <a:rPr lang="en-US" sz="3600" dirty="0"/>
-              <a:t>called the </a:t>
+              <a:t>is called the </a:t>
             </a:r>
             <a:r>
               <a:rPr lang="en-US" sz="3600" b="1" dirty="0">
@@ -11612,18 +11405,10 @@
                   <a:srgbClr val="C00000"/>
                 </a:solidFill>
               </a:rPr>
-              <a:t>sampling design or sampling </a:t>
-            </a:r>
-            <a:r>
-              <a:rPr lang="en-US" sz="3600" b="1" dirty="0" smtClean="0">
-                <a:solidFill>
-                  <a:srgbClr val="C00000"/>
-                </a:solidFill>
-              </a:rPr>
-              <a:t>strategy</a:t>
-            </a:r>
-            <a:r>
-              <a:rPr lang="en-US" sz="3600" b="1" dirty="0" smtClean="0"/>
+              <a:t>sampling design or sampling strategy</a:t>
+            </a:r>
+            <a:r>
+              <a:rPr lang="en-US" sz="3600" b="1" dirty="0"/>
               <a:t>.</a:t>
             </a:r>
           </a:p>
@@ -11642,12 +11427,8 @@
               <a:t>Each student, family </a:t>
             </a:r>
             <a:r>
-              <a:rPr lang="en-US" sz="3600" dirty="0" smtClean="0"/>
-              <a:t>that </a:t>
-            </a:r>
-            <a:r>
               <a:rPr lang="en-US" sz="3600" dirty="0"/>
-              <a:t>becomes the basis for selecting your sample is called </a:t>
+              <a:t>that becomes the basis for selecting your sample is called </a:t>
             </a:r>
             <a:r>
               <a:rPr lang="en-US" sz="3600" b="1" dirty="0">
@@ -11661,7 +11442,7 @@
               <a:rPr lang="en-US" sz="3600" dirty="0"/>
               <a:t>.</a:t>
             </a:r>
-            <a:endParaRPr lang="en-US" sz="3600" b="1" dirty="0" smtClean="0">
+            <a:endParaRPr lang="en-US" sz="3600" b="1" dirty="0">
               <a:solidFill>
                 <a:srgbClr val="C00000"/>
               </a:solidFill>
@@ -11673,7 +11454,7 @@
                 <a:spcPct val="150000"/>
               </a:lnSpc>
             </a:pPr>
-            <a:endParaRPr lang="en-US" sz="3600" b="1" dirty="0" smtClean="0">
+            <a:endParaRPr lang="en-US" sz="3600" b="1" dirty="0">
               <a:solidFill>
                 <a:srgbClr val="C00000"/>
               </a:solidFill>
@@ -11691,13 +11472,6 @@
   <p:clrMapOvr>
     <a:masterClrMapping/>
   </p:clrMapOvr>
-  <p:timing>
-    <p:tnLst>
-      <p:par>
-        <p:cTn id="1" dur="indefinite" restart="never" nodeType="tmRoot"/>
-      </p:par>
-    </p:tnLst>
-  </p:timing>
 </p:sld>
 </file>
 
@@ -11756,27 +11530,8 @@
                 <a:ea typeface="+mn-ea"/>
                 <a:cs typeface="+mn-cs"/>
               </a:rPr>
-              <a:t>3</a:t>
-            </a:r>
-            <a:r>
-              <a:rPr lang="en-ZA" altLang="en-US" sz="3600" b="1" dirty="0" smtClean="0">
-                <a:solidFill>
-                  <a:srgbClr val="0070C0"/>
-                </a:solidFill>
-                <a:latin typeface="+mn-lt"/>
-                <a:ea typeface="+mn-ea"/>
-                <a:cs typeface="+mn-cs"/>
-              </a:rPr>
-              <a:t>. Sampling Terminology …</a:t>
-            </a:r>
-            <a:endParaRPr lang="en-ZA" altLang="en-US" sz="3600" b="1" dirty="0">
-              <a:solidFill>
-                <a:srgbClr val="0070C0"/>
-              </a:solidFill>
-              <a:latin typeface="+mn-lt"/>
-              <a:ea typeface="+mn-ea"/>
-              <a:cs typeface="+mn-cs"/>
-            </a:endParaRPr>
+              <a:t>3. Sampling Terminology …</a:t>
+            </a:r>
           </a:p>
         </p:txBody>
       </p:sp>
@@ -11826,12 +11581,8 @@
               <a:t>list identifying each student, family </a:t>
             </a:r>
             <a:r>
-              <a:rPr lang="en-US" sz="3600" dirty="0" smtClean="0"/>
-              <a:t>in </a:t>
-            </a:r>
-            <a:r>
               <a:rPr lang="en-US" sz="3600" dirty="0"/>
-              <a:t>the study population is called the </a:t>
+              <a:t>in the study population is called the </a:t>
             </a:r>
             <a:r>
               <a:rPr lang="en-US" sz="3600" b="1" dirty="0">
@@ -11845,7 +11596,6 @@
               <a:rPr lang="en-US" sz="3600" dirty="0"/>
               <a:t>. </a:t>
             </a:r>
-            <a:endParaRPr lang="en-US" sz="3600" dirty="0" smtClean="0"/>
           </a:p>
           <a:p>
             <a:pPr algn="just">
@@ -11878,7 +11628,7 @@
               <a:t>sample statistics</a:t>
             </a:r>
             <a:r>
-              <a:rPr lang="en-US" sz="3600" dirty="0" smtClean="0"/>
+              <a:rPr lang="en-US" sz="3600" dirty="0"/>
               <a:t>.</a:t>
             </a:r>
           </a:p>
@@ -11888,7 +11638,7 @@
                 <a:spcPct val="150000"/>
               </a:lnSpc>
             </a:pPr>
-            <a:endParaRPr lang="en-US" sz="3600" dirty="0" smtClean="0"/>
+            <a:endParaRPr lang="en-US" sz="3600" dirty="0"/>
           </a:p>
           <a:p>
             <a:pPr algn="just">
@@ -11896,7 +11646,7 @@
                 <a:spcPct val="150000"/>
               </a:lnSpc>
             </a:pPr>
-            <a:endParaRPr lang="en-US" sz="3600" b="1" dirty="0" smtClean="0">
+            <a:endParaRPr lang="en-US" sz="3600" b="1" dirty="0">
               <a:solidFill>
                 <a:srgbClr val="C00000"/>
               </a:solidFill>
@@ -11914,13 +11664,6 @@
   <p:clrMapOvr>
     <a:masterClrMapping/>
   </p:clrMapOvr>
-  <p:timing>
-    <p:tnLst>
-      <p:par>
-        <p:cTn id="1" dur="indefinite" restart="never" nodeType="tmRoot"/>
-      </p:par>
-    </p:tnLst>
-  </p:timing>
 </p:sld>
 </file>
 
@@ -11979,27 +11722,8 @@
                 <a:ea typeface="+mn-ea"/>
                 <a:cs typeface="+mn-cs"/>
               </a:rPr>
-              <a:t>4</a:t>
-            </a:r>
-            <a:r>
-              <a:rPr lang="en-ZA" altLang="en-US" sz="3600" b="1" dirty="0" smtClean="0">
-                <a:solidFill>
-                  <a:srgbClr val="0070C0"/>
-                </a:solidFill>
-                <a:latin typeface="+mn-lt"/>
-                <a:ea typeface="+mn-ea"/>
-                <a:cs typeface="+mn-cs"/>
-              </a:rPr>
-              <a:t>. Types of Sampling (or Sampling Techniques) </a:t>
-            </a:r>
-            <a:endParaRPr lang="en-ZA" altLang="en-US" sz="3600" b="1" dirty="0">
-              <a:solidFill>
-                <a:srgbClr val="0070C0"/>
-              </a:solidFill>
-              <a:latin typeface="+mn-lt"/>
-              <a:ea typeface="+mn-ea"/>
-              <a:cs typeface="+mn-cs"/>
-            </a:endParaRPr>
+              <a:t>4. Types of Sampling (or Sampling Techniques) </a:t>
+            </a:r>
           </a:p>
         </p:txBody>
       </p:sp>
@@ -12039,13 +11763,6 @@
   <p:clrMapOvr>
     <a:masterClrMapping/>
   </p:clrMapOvr>
-  <p:timing>
-    <p:tnLst>
-      <p:par>
-        <p:cTn id="1" dur="indefinite" restart="never" nodeType="tmRoot"/>
-      </p:par>
-    </p:tnLst>
-  </p:timing>
 </p:sld>
 </file>
 
@@ -12104,21 +11821,10 @@
                 <a:ea typeface="+mn-ea"/>
                 <a:cs typeface="+mn-cs"/>
               </a:rPr>
-              <a:t>5</a:t>
-            </a:r>
-            <a:r>
-              <a:rPr lang="en-ZA" altLang="en-US" sz="3600" b="1" dirty="0" smtClean="0">
-                <a:solidFill>
-                  <a:srgbClr val="0070C0"/>
-                </a:solidFill>
-                <a:latin typeface="+mn-lt"/>
-                <a:ea typeface="+mn-ea"/>
-                <a:cs typeface="+mn-cs"/>
-              </a:rPr>
-              <a:t>. Probability Sampling</a:t>
+              <a:t>5. Probability Sampling</a:t>
             </a:r>
             <a:br>
-              <a:rPr lang="en-ZA" altLang="en-US" sz="3600" b="1" dirty="0" smtClean="0">
+              <a:rPr lang="en-ZA" altLang="en-US" sz="3600" b="1" dirty="0">
                 <a:solidFill>
                   <a:srgbClr val="0070C0"/>
                 </a:solidFill>
@@ -12175,7 +11881,6 @@
               <a:rPr lang="en-US" sz="3600" dirty="0"/>
               <a:t>Probability sampling is also known as ‘random sampling’ or ‘chance sampling’. </a:t>
             </a:r>
-            <a:endParaRPr lang="en-US" sz="3600" dirty="0" smtClean="0"/>
           </a:p>
           <a:p>
             <a:pPr algn="just">
@@ -12184,19 +11889,11 @@
               </a:lnSpc>
             </a:pPr>
             <a:r>
-              <a:rPr lang="en-US" sz="3600" dirty="0" smtClean="0"/>
-              <a:t>Under </a:t>
-            </a:r>
-            <a:r>
               <a:rPr lang="en-US" sz="3600" dirty="0"/>
-              <a:t>this sampling design, every item of the universe has an equal chance of inclusion in the </a:t>
-            </a:r>
-            <a:r>
-              <a:rPr lang="en-US" sz="3600" dirty="0" smtClean="0"/>
-              <a:t>sample.</a:t>
-            </a:r>
-            <a:r>
-              <a:rPr lang="en-ZA" sz="3300" dirty="0" smtClean="0"/>
+              <a:t>Under this sampling design, every item of the universe has an equal chance of inclusion in the sample.</a:t>
+            </a:r>
+            <a:r>
+              <a:rPr lang="en-ZA" sz="3300" dirty="0"/>
               <a:t> </a:t>
             </a:r>
           </a:p>
@@ -12208,10 +11905,10 @@
               <a:buNone/>
             </a:pPr>
             <a:r>
-              <a:rPr lang="en-ZA" dirty="0" smtClean="0"/>
+              <a:rPr lang="en-ZA" dirty="0"/>
               <a:t> </a:t>
             </a:r>
-            <a:endParaRPr lang="en-US" sz="3600" b="1" dirty="0" smtClean="0"/>
+            <a:endParaRPr lang="en-US" sz="3600" b="1" dirty="0"/>
           </a:p>
           <a:p>
             <a:pPr algn="just">
@@ -12219,7 +11916,7 @@
                 <a:spcPct val="150000"/>
               </a:lnSpc>
             </a:pPr>
-            <a:endParaRPr lang="en-US" sz="3600" b="1" dirty="0" smtClean="0">
+            <a:endParaRPr lang="en-US" sz="3600" b="1" dirty="0">
               <a:solidFill>
                 <a:srgbClr val="C00000"/>
               </a:solidFill>
@@ -12237,13 +11934,6 @@
   <p:clrMapOvr>
     <a:masterClrMapping/>
   </p:clrMapOvr>
-  <p:timing>
-    <p:tnLst>
-      <p:par>
-        <p:cTn id="1" dur="indefinite" restart="never" nodeType="tmRoot"/>
-      </p:par>
-    </p:tnLst>
-  </p:timing>
 </p:sld>
 </file>
 
@@ -12294,7 +11984,7 @@
           <a:p>
             <a:pPr eaLnBrk="1" hangingPunct="1"/>
             <a:r>
-              <a:rPr lang="en-ZA" altLang="en-US" sz="3600" b="1" dirty="0" smtClean="0">
+              <a:rPr lang="en-ZA" altLang="en-US" sz="3600" b="1" dirty="0">
                 <a:solidFill>
                   <a:srgbClr val="0070C0"/>
                 </a:solidFill>
@@ -12305,7 +11995,7 @@
               <a:t>Simple Random Sampling</a:t>
             </a:r>
             <a:br>
-              <a:rPr lang="en-ZA" altLang="en-US" sz="3600" b="1" dirty="0" smtClean="0">
+              <a:rPr lang="en-ZA" altLang="en-US" sz="3600" b="1" dirty="0">
                 <a:solidFill>
                   <a:srgbClr val="0070C0"/>
                 </a:solidFill>
@@ -12359,24 +12049,8 @@
               </a:lnSpc>
             </a:pPr>
             <a:r>
-              <a:rPr lang="en-ZA" sz="3300" dirty="0" smtClean="0"/>
-              <a:t>Random </a:t>
-            </a:r>
-            <a:r>
               <a:rPr lang="en-ZA" sz="3300" dirty="0"/>
-              <a:t>sampling gives each individual, group or organisation an equal chance of being selected as an </a:t>
-            </a:r>
-            <a:r>
-              <a:rPr lang="en-ZA" sz="3300" dirty="0" smtClean="0"/>
-              <a:t>object/item </a:t>
-            </a:r>
-            <a:r>
-              <a:rPr lang="en-ZA" sz="3300" dirty="0"/>
-              <a:t>of the </a:t>
-            </a:r>
-            <a:r>
-              <a:rPr lang="en-ZA" sz="3300" dirty="0" smtClean="0"/>
-              <a:t>study. </a:t>
+              <a:t>Random sampling gives each individual, group or organisation an equal chance of being selected as an object/item of the study. </a:t>
             </a:r>
           </a:p>
           <a:p>
@@ -12386,24 +12060,8 @@
               </a:lnSpc>
             </a:pPr>
             <a:r>
-              <a:rPr lang="en-US" sz="3300" dirty="0" smtClean="0"/>
-              <a:t>Random sampling every </a:t>
-            </a:r>
-            <a:r>
               <a:rPr lang="en-US" sz="3300" dirty="0"/>
-              <a:t>item of the </a:t>
-            </a:r>
-            <a:r>
-              <a:rPr lang="en-US" sz="3300" dirty="0" smtClean="0"/>
-              <a:t>universe/population </a:t>
-            </a:r>
-            <a:r>
-              <a:rPr lang="en-US" sz="3300" dirty="0"/>
-              <a:t>has an equal chance of inclusion in the </a:t>
-            </a:r>
-            <a:r>
-              <a:rPr lang="en-US" sz="3300" dirty="0" smtClean="0"/>
-              <a:t>sample.</a:t>
+              <a:t>Random sampling every item of the universe/population has an equal chance of inclusion in the sample.</a:t>
             </a:r>
           </a:p>
           <a:p>
@@ -12413,11 +12071,11 @@
               </a:lnSpc>
             </a:pPr>
             <a:r>
-              <a:rPr lang="en-US" sz="3300" dirty="0" smtClean="0"/>
+              <a:rPr lang="en-US" sz="3300" dirty="0"/>
               <a:t>For example, names of 20 employees be selected from a total of 250 employees in a company. Means that the population is all 250 employees, and the sample is random because each employee has an equal chance of being chosen.</a:t>
             </a:r>
             <a:r>
-              <a:rPr lang="en-ZA" dirty="0" smtClean="0"/>
+              <a:rPr lang="en-ZA" dirty="0"/>
               <a:t> </a:t>
             </a:r>
           </a:p>
@@ -12429,10 +12087,10 @@
               <a:buNone/>
             </a:pPr>
             <a:r>
-              <a:rPr lang="en-ZA" dirty="0" smtClean="0"/>
+              <a:rPr lang="en-ZA" dirty="0"/>
               <a:t> </a:t>
             </a:r>
-            <a:endParaRPr lang="en-US" sz="3600" b="1" dirty="0" smtClean="0"/>
+            <a:endParaRPr lang="en-US" sz="3600" b="1" dirty="0"/>
           </a:p>
           <a:p>
             <a:pPr algn="just">
@@ -12440,7 +12098,7 @@
                 <a:spcPct val="150000"/>
               </a:lnSpc>
             </a:pPr>
-            <a:endParaRPr lang="en-US" sz="3600" b="1" dirty="0" smtClean="0">
+            <a:endParaRPr lang="en-US" sz="3600" b="1" dirty="0">
               <a:solidFill>
                 <a:srgbClr val="C00000"/>
               </a:solidFill>
@@ -12458,13 +12116,6 @@
   <p:clrMapOvr>
     <a:masterClrMapping/>
   </p:clrMapOvr>
-  <p:timing>
-    <p:tnLst>
-      <p:par>
-        <p:cTn id="1" dur="indefinite" restart="never" nodeType="tmRoot"/>
-      </p:par>
-    </p:tnLst>
-  </p:timing>
 </p:sld>
 </file>
 
@@ -12515,7 +12166,7 @@
           <a:p>
             <a:pPr eaLnBrk="1" hangingPunct="1"/>
             <a:r>
-              <a:rPr lang="en-ZA" altLang="en-US" sz="3600" b="1" dirty="0" smtClean="0">
+              <a:rPr lang="en-ZA" altLang="en-US" sz="3600" b="1" dirty="0">
                 <a:solidFill>
                   <a:srgbClr val="0070C0"/>
                 </a:solidFill>
@@ -12526,7 +12177,7 @@
               <a:t>Stratified Random Sampling</a:t>
             </a:r>
             <a:br>
-              <a:rPr lang="en-ZA" altLang="en-US" sz="3600" b="1" dirty="0" smtClean="0">
+              <a:rPr lang="en-ZA" altLang="en-US" sz="3600" b="1" dirty="0">
                 <a:solidFill>
                   <a:srgbClr val="0070C0"/>
                 </a:solidFill>
@@ -12580,11 +12231,11 @@
               </a:lnSpc>
             </a:pPr>
             <a:r>
-              <a:rPr lang="en-ZA" sz="3300" dirty="0" smtClean="0"/>
+              <a:rPr lang="en-ZA" sz="3300" dirty="0"/>
               <a:t>Researcher divides population into separate groups called </a:t>
             </a:r>
             <a:r>
-              <a:rPr lang="en-ZA" sz="3300" b="1" dirty="0" smtClean="0">
+              <a:rPr lang="en-ZA" sz="3300" b="1" dirty="0">
                 <a:solidFill>
                   <a:srgbClr val="C00000"/>
                 </a:solidFill>
@@ -12592,7 +12243,7 @@
               <a:t>strata</a:t>
             </a:r>
             <a:r>
-              <a:rPr lang="en-ZA" sz="3300" dirty="0" smtClean="0"/>
+              <a:rPr lang="en-ZA" sz="3300" dirty="0"/>
               <a:t>.</a:t>
             </a:r>
           </a:p>
@@ -12603,11 +12254,11 @@
               </a:lnSpc>
             </a:pPr>
             <a:r>
-              <a:rPr lang="en-ZA" sz="3300" dirty="0" smtClean="0"/>
+              <a:rPr lang="en-ZA" sz="3300" dirty="0"/>
               <a:t> Stratification is a process of dividing members of population into </a:t>
             </a:r>
             <a:r>
-              <a:rPr lang="en-ZA" sz="3300" dirty="0" smtClean="0">
+              <a:rPr lang="en-ZA" sz="3300" dirty="0">
                 <a:solidFill>
                   <a:srgbClr val="C00000"/>
                 </a:solidFill>
@@ -12615,7 +12266,7 @@
               <a:t>homogeneous subgroups before sampling</a:t>
             </a:r>
             <a:r>
-              <a:rPr lang="en-ZA" sz="3300" dirty="0" smtClean="0"/>
+              <a:rPr lang="en-ZA" sz="3300" dirty="0"/>
               <a:t>. </a:t>
             </a:r>
           </a:p>
@@ -12627,7 +12278,7 @@
               <a:buNone/>
             </a:pPr>
             <a:r>
-              <a:rPr lang="en-ZA" sz="3300" dirty="0" smtClean="0"/>
+              <a:rPr lang="en-ZA" sz="3300" dirty="0"/>
               <a:t>For example people living in Urban area, homogenous subgroups: government employees, students, private sector employees etc. Then select sample where members are selected from each subgroup.</a:t>
             </a:r>
           </a:p>
@@ -12637,7 +12288,7 @@
                 <a:spcPct val="150000"/>
               </a:lnSpc>
             </a:pPr>
-            <a:endParaRPr lang="en-ZA" sz="3300" dirty="0" smtClean="0"/>
+            <a:endParaRPr lang="en-ZA" sz="3300" dirty="0"/>
           </a:p>
           <a:p>
             <a:pPr algn="just">
@@ -12645,7 +12296,7 @@
                 <a:spcPct val="150000"/>
               </a:lnSpc>
             </a:pPr>
-            <a:endParaRPr lang="en-US" sz="3600" b="1" dirty="0" smtClean="0">
+            <a:endParaRPr lang="en-US" sz="3600" b="1" dirty="0">
               <a:solidFill>
                 <a:srgbClr val="C00000"/>
               </a:solidFill>
@@ -12663,13 +12314,6 @@
   <p:clrMapOvr>
     <a:masterClrMapping/>
   </p:clrMapOvr>
-  <p:timing>
-    <p:tnLst>
-      <p:par>
-        <p:cTn id="1" dur="indefinite" restart="never" nodeType="tmRoot"/>
-      </p:par>
-    </p:tnLst>
-  </p:timing>
 </p:sld>
 </file>
 
@@ -12720,7 +12364,7 @@
           <a:p>
             <a:pPr eaLnBrk="1" hangingPunct="1"/>
             <a:r>
-              <a:rPr lang="en-ZA" altLang="en-US" sz="3600" b="1" dirty="0" smtClean="0">
+              <a:rPr lang="en-ZA" altLang="en-US" sz="3600" b="1" dirty="0">
                 <a:solidFill>
                   <a:srgbClr val="0070C0"/>
                 </a:solidFill>
@@ -12730,14 +12374,6 @@
               </a:rPr>
               <a:t>Cluster Sampling</a:t>
             </a:r>
-            <a:endParaRPr lang="en-ZA" altLang="en-US" sz="3600" b="1" dirty="0">
-              <a:solidFill>
-                <a:srgbClr val="0070C0"/>
-              </a:solidFill>
-              <a:latin typeface="+mn-lt"/>
-              <a:ea typeface="+mn-ea"/>
-              <a:cs typeface="+mn-cs"/>
-            </a:endParaRPr>
           </a:p>
         </p:txBody>
       </p:sp>
@@ -12776,15 +12412,7 @@
             </a:pPr>
             <a:r>
               <a:rPr lang="en-US" sz="3600" dirty="0"/>
-              <a:t>Cluster sampling is based on the ability of the researcher to divide the sampling </a:t>
-            </a:r>
-            <a:r>
-              <a:rPr lang="en-US" sz="3600" dirty="0" smtClean="0"/>
-              <a:t>population </a:t>
-            </a:r>
-            <a:r>
-              <a:rPr lang="en-US" sz="3600" dirty="0"/>
-              <a:t>into groups (based upon visible or easily </a:t>
+              <a:t>Cluster sampling is based on the ability of the researcher to divide the sampling population into groups (based upon visible or easily </a:t>
             </a:r>
             <a:r>
               <a:rPr lang="en-US" sz="3600" dirty="0">
@@ -12808,11 +12436,7 @@
             </a:r>
             <a:r>
               <a:rPr lang="en-US" sz="3600" dirty="0"/>
-              <a:t>, and then to select elements within each </a:t>
-            </a:r>
-            <a:r>
-              <a:rPr lang="en-US" sz="3600" dirty="0" smtClean="0"/>
-              <a:t>cluster.</a:t>
+              <a:t>, and then to select elements within each cluster.</a:t>
             </a:r>
           </a:p>
           <a:p>
@@ -12823,11 +12447,7 @@
             </a:pPr>
             <a:r>
               <a:rPr lang="en-US" sz="3600" dirty="0"/>
-              <a:t>Clusters can be formed on the basis of geographical proximity or a common characteristic that has a correlation with the main variable of the </a:t>
-            </a:r>
-            <a:r>
-              <a:rPr lang="en-US" sz="3600" dirty="0"/>
-              <a:t>study.</a:t>
+              <a:t>Clusters can be formed on the basis of geographical proximity or a common characteristic that has a correlation with the main variable of the study.</a:t>
             </a:r>
             <a:endParaRPr lang="en-GB" sz="3600" dirty="0"/>
           </a:p>
@@ -12871,13 +12491,6 @@
   <p:clrMapOvr>
     <a:masterClrMapping/>
   </p:clrMapOvr>
-  <p:timing>
-    <p:tnLst>
-      <p:par>
-        <p:cTn id="1" dur="indefinite" restart="never" nodeType="tmRoot"/>
-      </p:par>
-    </p:tnLst>
-  </p:timing>
 </p:sld>
 </file>
 
@@ -12928,7 +12541,7 @@
           <a:p>
             <a:pPr eaLnBrk="1" hangingPunct="1"/>
             <a:r>
-              <a:rPr lang="en-ZA" altLang="en-US" sz="3600" b="1" dirty="0" smtClean="0">
+              <a:rPr lang="en-ZA" altLang="en-US" sz="3600" b="1" dirty="0">
                 <a:solidFill>
                   <a:srgbClr val="0070C0"/>
                 </a:solidFill>
@@ -12938,14 +12551,6 @@
               </a:rPr>
               <a:t>6. Non-Probability Sampling</a:t>
             </a:r>
-            <a:endParaRPr lang="en-ZA" altLang="en-US" sz="3600" b="1" dirty="0">
-              <a:solidFill>
-                <a:srgbClr val="0070C0"/>
-              </a:solidFill>
-              <a:latin typeface="+mn-lt"/>
-              <a:ea typeface="+mn-ea"/>
-              <a:cs typeface="+mn-cs"/>
-            </a:endParaRPr>
           </a:p>
         </p:txBody>
       </p:sp>
@@ -12989,7 +12594,6 @@
               <a:rPr lang="en-US" sz="4000" dirty="0"/>
               <a:t>Non-probability sampling designs do not follow the theory of probability in the choice of elements from the sampling population. </a:t>
             </a:r>
-            <a:endParaRPr lang="en-US" sz="4000" dirty="0" smtClean="0"/>
           </a:p>
           <a:p>
             <a:pPr algn="just">
@@ -13001,12 +12605,8 @@
               </a:spcBef>
             </a:pPr>
             <a:r>
-              <a:rPr lang="en-US" sz="4000" dirty="0" smtClean="0"/>
-              <a:t>Non-probability </a:t>
-            </a:r>
-            <a:r>
               <a:rPr lang="en-US" sz="4000" dirty="0"/>
-              <a:t>sampling designs are used </a:t>
+              <a:t>Non-probability sampling designs are used </a:t>
             </a:r>
             <a:r>
               <a:rPr lang="en-US" sz="4000" dirty="0">
@@ -13014,21 +12614,13 @@
                   <a:srgbClr val="C00000"/>
                 </a:solidFill>
               </a:rPr>
-              <a:t>when the number of elements in a population is either unknown or cannot be individually </a:t>
-            </a:r>
-            <a:r>
-              <a:rPr lang="en-US" sz="4000" dirty="0" smtClean="0">
-                <a:solidFill>
-                  <a:srgbClr val="C00000"/>
-                </a:solidFill>
-              </a:rPr>
-              <a:t>identified</a:t>
+              <a:t>when the number of elements in a population is either unknown or cannot be individually identified</a:t>
             </a:r>
             <a:r>
               <a:rPr lang="en-US" sz="4000" dirty="0"/>
               <a:t>. In such situations the selection of elements is dependent upon other considerations. </a:t>
             </a:r>
-            <a:endParaRPr lang="en-GB" sz="3800" dirty="0" smtClean="0"/>
+            <a:endParaRPr lang="en-GB" sz="3800" dirty="0"/>
           </a:p>
           <a:p>
             <a:pPr algn="just">
@@ -13070,13 +12662,6 @@
   <p:clrMapOvr>
     <a:masterClrMapping/>
   </p:clrMapOvr>
-  <p:timing>
-    <p:tnLst>
-      <p:par>
-        <p:cTn id="1" dur="indefinite" restart="never" nodeType="tmRoot"/>
-      </p:par>
-    </p:tnLst>
-  </p:timing>
 </p:sld>
 </file>
 
@@ -13127,7 +12712,7 @@
           <a:p>
             <a:pPr eaLnBrk="1" hangingPunct="1"/>
             <a:r>
-              <a:rPr lang="en-ZA" altLang="en-US" sz="3600" b="1" dirty="0" smtClean="0">
+              <a:rPr lang="en-ZA" altLang="en-US" sz="3600" b="1" dirty="0">
                 <a:solidFill>
                   <a:srgbClr val="0070C0"/>
                 </a:solidFill>
@@ -13137,14 +12722,6 @@
               </a:rPr>
               <a:t>Non-Probability Sampling …</a:t>
             </a:r>
-            <a:endParaRPr lang="en-ZA" altLang="en-US" sz="3600" b="1" dirty="0">
-              <a:solidFill>
-                <a:srgbClr val="0070C0"/>
-              </a:solidFill>
-              <a:latin typeface="+mn-lt"/>
-              <a:ea typeface="+mn-ea"/>
-              <a:cs typeface="+mn-cs"/>
-            </a:endParaRPr>
           </a:p>
         </p:txBody>
       </p:sp>
@@ -13186,27 +12763,15 @@
             </a:pPr>
             <a:r>
               <a:rPr lang="en-US" sz="4000" dirty="0"/>
-              <a:t>There are five commonly used non-random designs, each based on a different consideration</a:t>
-            </a:r>
-            <a:r>
-              <a:rPr lang="en-US" sz="4000" dirty="0" smtClean="0"/>
-              <a:t>, </a:t>
-            </a:r>
-            <a:r>
-              <a:rPr lang="en-US" sz="4000" dirty="0" smtClean="0">
+              <a:t>There are five commonly used non-random designs, each based on a different consideration, </a:t>
+            </a:r>
+            <a:r>
+              <a:rPr lang="en-US" sz="4000" dirty="0">
                 <a:solidFill>
                   <a:srgbClr val="C00000"/>
                 </a:solidFill>
               </a:rPr>
-              <a:t>which </a:t>
-            </a:r>
-            <a:r>
-              <a:rPr lang="en-US" sz="4000" dirty="0">
-                <a:solidFill>
-                  <a:srgbClr val="C00000"/>
-                </a:solidFill>
-              </a:rPr>
-              <a:t>are commonly used in both qualitative and quantitative research</a:t>
+              <a:t>which are commonly used in both qualitative and quantitative research</a:t>
             </a:r>
             <a:r>
               <a:rPr lang="en-US" sz="4000" dirty="0"/>
@@ -13225,12 +12790,8 @@
               <a:buAutoNum type="arabicPeriod"/>
             </a:pPr>
             <a:r>
-              <a:rPr lang="en-US" sz="3600" dirty="0" smtClean="0"/>
-              <a:t>quota </a:t>
-            </a:r>
-            <a:r>
               <a:rPr lang="en-US" sz="3600" dirty="0"/>
-              <a:t>sampling;</a:t>
+              <a:t>quota sampling;</a:t>
             </a:r>
           </a:p>
           <a:p>
@@ -13245,12 +12806,8 @@
               <a:buAutoNum type="arabicPeriod"/>
             </a:pPr>
             <a:r>
-              <a:rPr lang="en-US" sz="3600" dirty="0" smtClean="0"/>
-              <a:t>accidental </a:t>
-            </a:r>
-            <a:r>
               <a:rPr lang="en-US" sz="3600" dirty="0"/>
-              <a:t>sampling;</a:t>
+              <a:t>accidental sampling;</a:t>
             </a:r>
           </a:p>
           <a:p>
@@ -13265,12 +12822,8 @@
               <a:buAutoNum type="arabicPeriod"/>
             </a:pPr>
             <a:r>
-              <a:rPr lang="en-US" sz="3600" dirty="0" smtClean="0"/>
-              <a:t>judgmental </a:t>
-            </a:r>
-            <a:r>
               <a:rPr lang="en-US" sz="3600" dirty="0"/>
-              <a:t>sampling or purposive sampling; </a:t>
+              <a:t>judgmental sampling or purposive sampling; </a:t>
             </a:r>
           </a:p>
           <a:p>
@@ -13285,12 +12838,8 @@
               <a:buAutoNum type="arabicPeriod"/>
             </a:pPr>
             <a:r>
-              <a:rPr lang="en-US" sz="3600" dirty="0" smtClean="0"/>
-              <a:t> </a:t>
-            </a:r>
-            <a:r>
               <a:rPr lang="en-US" sz="3600" dirty="0"/>
-              <a:t>expert sampling;</a:t>
+              <a:t> expert sampling;</a:t>
             </a:r>
           </a:p>
           <a:p>
@@ -13305,10 +12854,10 @@
               <a:buAutoNum type="arabicPeriod"/>
             </a:pPr>
             <a:r>
-              <a:rPr lang="en-US" sz="3600" dirty="0" smtClean="0"/>
+              <a:rPr lang="en-US" sz="3600" dirty="0"/>
               <a:t>snowball sampling.</a:t>
             </a:r>
-            <a:endParaRPr lang="en-GB" sz="3400" dirty="0" smtClean="0">
+            <a:endParaRPr lang="en-GB" sz="3400" dirty="0">
               <a:solidFill>
                 <a:srgbClr val="C00000"/>
               </a:solidFill>
@@ -13339,13 +12888,6 @@
   <p:clrMapOvr>
     <a:masterClrMapping/>
   </p:clrMapOvr>
-  <p:timing>
-    <p:tnLst>
-      <p:par>
-        <p:cTn id="1" dur="indefinite" restart="never" nodeType="tmRoot"/>
-      </p:par>
-    </p:tnLst>
-  </p:timing>
 </p:sld>
 </file>
 
@@ -13396,7 +12938,7 @@
           <a:p>
             <a:pPr algn="ctr" eaLnBrk="1" hangingPunct="1"/>
             <a:r>
-              <a:rPr lang="en-ZA" altLang="en-US" sz="2800" b="1" dirty="0" smtClean="0">
+              <a:rPr lang="en-ZA" altLang="en-US" sz="2800" b="1" dirty="0">
                 <a:solidFill>
                   <a:srgbClr val="0070C0"/>
                 </a:solidFill>
@@ -13407,7 +12949,7 @@
               <a:t>Read This Slowly by </a:t>
             </a:r>
             <a:r>
-              <a:rPr lang="en-ZA" altLang="en-US" sz="2800" b="1" dirty="0" err="1" smtClean="0">
+              <a:rPr lang="en-ZA" altLang="en-US" sz="2800" b="1" dirty="0" err="1">
                 <a:solidFill>
                   <a:srgbClr val="0070C0"/>
                 </a:solidFill>
@@ -13463,11 +13005,11 @@
               <a:buNone/>
             </a:pPr>
             <a:r>
-              <a:rPr lang="en-GB" altLang="en-US" dirty="0" smtClean="0"/>
+              <a:rPr lang="en-GB" altLang="en-US" dirty="0"/>
               <a:t>“The </a:t>
             </a:r>
             <a:r>
-              <a:rPr lang="en-GB" altLang="en-US" b="1" dirty="0" smtClean="0">
+              <a:rPr lang="en-GB" altLang="en-US" b="1" dirty="0">
                 <a:solidFill>
                   <a:srgbClr val="C00000"/>
                 </a:solidFill>
@@ -13475,7 +13017,7 @@
               <a:t>Universe responds to your frequency. </a:t>
             </a:r>
             <a:r>
-              <a:rPr lang="en-GB" altLang="en-US" dirty="0" smtClean="0"/>
+              <a:rPr lang="en-GB" altLang="en-US" dirty="0"/>
               <a:t>It does not recognize your personal desires, wants or needs. It only understands the frequency in which you are vibrating at. </a:t>
             </a:r>
           </a:p>
@@ -13487,7 +13029,7 @@
               <a:buNone/>
             </a:pPr>
             <a:r>
-              <a:rPr lang="en-GB" altLang="en-US" i="1" dirty="0" smtClean="0"/>
+              <a:rPr lang="en-GB" altLang="en-US" i="1" dirty="0"/>
               <a:t>For example, </a:t>
             </a:r>
           </a:p>
@@ -13500,11 +13042,11 @@
               <a:buChar char="q"/>
             </a:pPr>
             <a:r>
-              <a:rPr lang="en-GB" altLang="en-US" dirty="0" smtClean="0"/>
+              <a:rPr lang="en-GB" altLang="en-US" dirty="0"/>
               <a:t>If you are vibrating in the frequency of </a:t>
             </a:r>
             <a:r>
-              <a:rPr lang="en-GB" altLang="en-US" b="1" dirty="0" smtClean="0">
+              <a:rPr lang="en-GB" altLang="en-US" b="1" dirty="0">
                 <a:solidFill>
                   <a:srgbClr val="C00000"/>
                 </a:solidFill>
@@ -13512,7 +13054,7 @@
               <a:t>fear, guilt or shame</a:t>
             </a:r>
             <a:r>
-              <a:rPr lang="en-GB" altLang="en-US" dirty="0" smtClean="0"/>
+              <a:rPr lang="en-GB" altLang="en-US" dirty="0"/>
               <a:t>, you are going to attract things of similar vibration to support that frequency. </a:t>
             </a:r>
           </a:p>
@@ -13525,11 +13067,11 @@
               <a:buChar char="q"/>
             </a:pPr>
             <a:r>
-              <a:rPr lang="en-GB" altLang="en-US" dirty="0" smtClean="0"/>
+              <a:rPr lang="en-GB" altLang="en-US" dirty="0"/>
               <a:t>If you are vibrating in the frequency of </a:t>
             </a:r>
             <a:r>
-              <a:rPr lang="en-GB" altLang="en-US" b="1" dirty="0" smtClean="0">
+              <a:rPr lang="en-GB" altLang="en-US" b="1" dirty="0">
                 <a:solidFill>
                   <a:srgbClr val="C00000"/>
                 </a:solidFill>
@@ -13537,10 +13079,9 @@
               <a:t>love, joy and abundance, </a:t>
             </a:r>
             <a:r>
-              <a:rPr lang="en-GB" altLang="en-US" dirty="0" smtClean="0"/>
+              <a:rPr lang="en-GB" altLang="en-US" dirty="0"/>
               <a:t>you are going to attract things to support that frequency.</a:t>
             </a:r>
-            <a:endParaRPr lang="en-GB" altLang="en-US" dirty="0"/>
           </a:p>
           <a:p>
             <a:pPr marL="0" indent="0" algn="just">
@@ -13550,11 +13091,11 @@
               <a:buNone/>
             </a:pPr>
             <a:r>
-              <a:rPr lang="en-GB" altLang="en-US" dirty="0" smtClean="0"/>
+              <a:rPr lang="en-GB" altLang="en-US" dirty="0"/>
               <a:t>It is like tuning into a radio station. You have to be tuned into the radio station you want to listen to just like </a:t>
             </a:r>
             <a:r>
-              <a:rPr lang="en-GB" altLang="en-US" b="1" dirty="0" smtClean="0">
+              <a:rPr lang="en-GB" altLang="en-US" b="1" dirty="0">
                 <a:solidFill>
                   <a:srgbClr val="C00000"/>
                 </a:solidFill>
@@ -13562,14 +13103,14 @@
               <a:t>you have to be tuned into energy you want to manifest in your </a:t>
             </a:r>
             <a:r>
-              <a:rPr lang="en-GB" altLang="en-US" b="1" smtClean="0">
+              <a:rPr lang="en-GB" altLang="en-US" b="1">
                 <a:solidFill>
                   <a:srgbClr val="C00000"/>
                 </a:solidFill>
               </a:rPr>
               <a:t>life”.</a:t>
             </a:r>
-            <a:endParaRPr lang="en-GB" altLang="en-US" b="1" dirty="0" smtClean="0"/>
+            <a:endParaRPr lang="en-GB" altLang="en-US" b="1" dirty="0"/>
           </a:p>
           <a:p>
             <a:pPr marL="0" indent="0">
@@ -13605,13 +13146,6 @@
   <p:clrMapOvr>
     <a:masterClrMapping/>
   </p:clrMapOvr>
-  <p:timing>
-    <p:tnLst>
-      <p:par>
-        <p:cTn id="1" dur="indefinite" restart="never" nodeType="tmRoot"/>
-      </p:par>
-    </p:tnLst>
-  </p:timing>
 </p:sld>
 </file>
 
@@ -13662,7 +13196,7 @@
           <a:p>
             <a:pPr eaLnBrk="1" hangingPunct="1"/>
             <a:r>
-              <a:rPr lang="en-ZA" altLang="en-US" sz="3600" b="1" dirty="0" smtClean="0">
+              <a:rPr lang="en-ZA" altLang="en-US" sz="3600" b="1" dirty="0">
                 <a:solidFill>
                   <a:srgbClr val="0070C0"/>
                 </a:solidFill>
@@ -13672,14 +13206,6 @@
               </a:rPr>
               <a:t>Quota Sampling</a:t>
             </a:r>
-            <a:endParaRPr lang="en-ZA" altLang="en-US" sz="3600" b="1" dirty="0">
-              <a:solidFill>
-                <a:srgbClr val="0070C0"/>
-              </a:solidFill>
-              <a:latin typeface="+mn-lt"/>
-              <a:ea typeface="+mn-ea"/>
-              <a:cs typeface="+mn-cs"/>
-            </a:endParaRPr>
           </a:p>
         </p:txBody>
       </p:sp>
@@ -13721,15 +13247,7 @@
             </a:pPr>
             <a:r>
               <a:rPr lang="en-US" sz="3200" dirty="0"/>
-              <a:t>The main consideration directing quota sampling is the researcher’s ease of access to the </a:t>
-            </a:r>
-            <a:r>
-              <a:rPr lang="en-US" sz="3200" dirty="0" smtClean="0"/>
-              <a:t>sample </a:t>
-            </a:r>
-            <a:r>
-              <a:rPr lang="en-US" sz="3200" dirty="0"/>
-              <a:t>population. In addition to convenience, you are guided by some </a:t>
+              <a:t>The main consideration directing quota sampling is the researcher’s ease of access to the sample population. In addition to convenience, you are guided by some </a:t>
             </a:r>
             <a:r>
               <a:rPr lang="en-US" sz="3200" dirty="0">
@@ -13737,15 +13255,7 @@
                   <a:srgbClr val="C00000"/>
                 </a:solidFill>
               </a:rPr>
-              <a:t>visible characteristic, such as gender or race, of the study population that is of interest to you</a:t>
-            </a:r>
-            <a:r>
-              <a:rPr lang="en-US" sz="3200" dirty="0" smtClean="0">
-                <a:solidFill>
-                  <a:srgbClr val="C00000"/>
-                </a:solidFill>
-              </a:rPr>
-              <a:t>.</a:t>
+              <a:t>visible characteristic, such as gender or race, of the study population that is of interest to you.</a:t>
             </a:r>
           </a:p>
           <a:p>
@@ -13758,12 +13268,8 @@
               </a:spcBef>
             </a:pPr>
             <a:r>
-              <a:rPr lang="en-US" sz="3200" dirty="0" smtClean="0"/>
-              <a:t>The </a:t>
-            </a:r>
-            <a:r>
               <a:rPr lang="en-US" sz="3200" dirty="0"/>
-              <a:t>sample is </a:t>
+              <a:t>The sample is </a:t>
             </a:r>
             <a:r>
               <a:rPr lang="en-US" sz="3200" dirty="0">
@@ -13777,7 +13283,6 @@
               <a:rPr lang="en-US" sz="3200" dirty="0"/>
               <a:t> to you as a researcher, and whenever a person with this visible relevant characteristic is seen that person is asked to participate in the study. </a:t>
             </a:r>
-            <a:endParaRPr lang="en-US" sz="3200" dirty="0" smtClean="0"/>
           </a:p>
           <a:p>
             <a:pPr algn="just">
@@ -13789,12 +13294,8 @@
               </a:spcBef>
             </a:pPr>
             <a:r>
-              <a:rPr lang="en-US" sz="3200" dirty="0" smtClean="0"/>
-              <a:t>The </a:t>
-            </a:r>
-            <a:r>
               <a:rPr lang="en-US" sz="3200" dirty="0"/>
-              <a:t>process continues </a:t>
+              <a:t>The process continues </a:t>
             </a:r>
             <a:r>
               <a:rPr lang="en-US" sz="3200" dirty="0">
@@ -13826,13 +13327,6 @@
   <p:clrMapOvr>
     <a:masterClrMapping/>
   </p:clrMapOvr>
-  <p:timing>
-    <p:tnLst>
-      <p:par>
-        <p:cTn id="1" dur="indefinite" restart="never" nodeType="tmRoot"/>
-      </p:par>
-    </p:tnLst>
-  </p:timing>
 </p:sld>
 </file>
 
@@ -13883,7 +13377,7 @@
           <a:p>
             <a:pPr eaLnBrk="1" hangingPunct="1"/>
             <a:r>
-              <a:rPr lang="en-ZA" altLang="en-US" sz="3600" b="1" dirty="0" smtClean="0">
+              <a:rPr lang="en-ZA" altLang="en-US" sz="3600" b="1" dirty="0">
                 <a:solidFill>
                   <a:srgbClr val="0070C0"/>
                 </a:solidFill>
@@ -13893,14 +13387,6 @@
               </a:rPr>
               <a:t>Quota Sampling …</a:t>
             </a:r>
-            <a:endParaRPr lang="en-ZA" altLang="en-US" sz="3600" b="1" dirty="0">
-              <a:solidFill>
-                <a:srgbClr val="0070C0"/>
-              </a:solidFill>
-              <a:latin typeface="+mn-lt"/>
-              <a:ea typeface="+mn-ea"/>
-              <a:cs typeface="+mn-cs"/>
-            </a:endParaRPr>
           </a:p>
         </p:txBody>
       </p:sp>
@@ -13942,7 +13428,7 @@
               <a:buNone/>
             </a:pPr>
             <a:r>
-              <a:rPr lang="en-US" sz="3200" b="1" dirty="0" smtClean="0"/>
+              <a:rPr lang="en-US" sz="3200" b="1" dirty="0"/>
               <a:t>Example</a:t>
             </a:r>
           </a:p>
@@ -13968,7 +13454,7 @@
               <a:t>to select a sample of 20 male students in order to find out the average age of the male students in your class</a:t>
             </a:r>
             <a:r>
-              <a:rPr lang="en-US" sz="3200" dirty="0" smtClean="0"/>
+              <a:rPr lang="en-US" sz="3200" dirty="0"/>
               <a:t>.</a:t>
             </a:r>
           </a:p>
@@ -13982,7 +13468,7 @@
               </a:spcBef>
             </a:pPr>
             <a:r>
-              <a:rPr lang="en-US" sz="3200" dirty="0" smtClean="0"/>
+              <a:rPr lang="en-US" sz="3200" dirty="0"/>
               <a:t>You </a:t>
             </a:r>
             <a:r>
@@ -14007,11 +13493,7 @@
             </a:r>
             <a:r>
               <a:rPr lang="en-US" sz="3200" dirty="0"/>
-              <a:t>, and whenever a male student enters the classroom, you ask his age. This process continues until you have asked 20 students their </a:t>
-            </a:r>
-            <a:r>
-              <a:rPr lang="en-US" sz="3200" dirty="0" smtClean="0"/>
-              <a:t>age.</a:t>
+              <a:t>, and whenever a male student enters the classroom, you ask his age. This process continues until you have asked 20 students their age.</a:t>
             </a:r>
             <a:endParaRPr lang="en-GB" sz="3100" dirty="0">
               <a:solidFill>
@@ -14031,13 +13513,6 @@
   <p:clrMapOvr>
     <a:masterClrMapping/>
   </p:clrMapOvr>
-  <p:timing>
-    <p:tnLst>
-      <p:par>
-        <p:cTn id="1" dur="indefinite" restart="never" nodeType="tmRoot"/>
-      </p:par>
-    </p:tnLst>
-  </p:timing>
 </p:sld>
 </file>
 
@@ -14088,7 +13563,7 @@
           <a:p>
             <a:pPr eaLnBrk="1" hangingPunct="1"/>
             <a:r>
-              <a:rPr lang="en-ZA" altLang="en-US" sz="3600" b="1" dirty="0" smtClean="0">
+              <a:rPr lang="en-ZA" altLang="en-US" sz="3600" b="1" dirty="0">
                 <a:solidFill>
                   <a:srgbClr val="0070C0"/>
                 </a:solidFill>
@@ -14096,27 +13571,8 @@
                 <a:ea typeface="+mn-ea"/>
                 <a:cs typeface="+mn-cs"/>
               </a:rPr>
-              <a:t>Purposive</a:t>
-            </a:r>
-            <a:r>
-              <a:rPr lang="en-ZA" altLang="en-US" sz="3600" b="1" dirty="0" smtClean="0">
-                <a:solidFill>
-                  <a:srgbClr val="0070C0"/>
-                </a:solidFill>
-                <a:latin typeface="+mn-lt"/>
-                <a:ea typeface="+mn-ea"/>
-                <a:cs typeface="+mn-cs"/>
-              </a:rPr>
-              <a:t> Sampling</a:t>
-            </a:r>
-            <a:endParaRPr lang="en-ZA" altLang="en-US" sz="3600" b="1" dirty="0">
-              <a:solidFill>
-                <a:srgbClr val="0070C0"/>
-              </a:solidFill>
-              <a:latin typeface="+mn-lt"/>
-              <a:ea typeface="+mn-ea"/>
-              <a:cs typeface="+mn-cs"/>
-            </a:endParaRPr>
+              <a:t>Purposive Sampling</a:t>
+            </a:r>
           </a:p>
         </p:txBody>
       </p:sp>
@@ -14160,7 +13616,6 @@
               <a:rPr lang="en-US" sz="3200" dirty="0"/>
               <a:t>The primary consideration in purposive sampling is your judgement as to who can provide the best information to achieve the objectives of your study. </a:t>
             </a:r>
-            <a:endParaRPr lang="en-US" sz="3200" dirty="0" smtClean="0"/>
           </a:p>
           <a:p>
             <a:pPr algn="just">
@@ -14172,12 +13627,8 @@
               </a:spcBef>
             </a:pPr>
             <a:r>
-              <a:rPr lang="en-US" sz="3200" dirty="0" smtClean="0"/>
-              <a:t>Researcher </a:t>
-            </a:r>
-            <a:r>
               <a:rPr lang="en-US" sz="3200" dirty="0"/>
-              <a:t>only go to those </a:t>
+              <a:t>Researcher only go to those </a:t>
             </a:r>
             <a:r>
               <a:rPr lang="en-US" sz="3200" dirty="0">
@@ -14205,13 +13656,6 @@
   <p:clrMapOvr>
     <a:masterClrMapping/>
   </p:clrMapOvr>
-  <p:timing>
-    <p:tnLst>
-      <p:par>
-        <p:cTn id="1" dur="indefinite" restart="never" nodeType="tmRoot"/>
-      </p:par>
-    </p:tnLst>
-  </p:timing>
 </p:sld>
 </file>
 
@@ -14262,7 +13706,7 @@
           <a:p>
             <a:pPr eaLnBrk="1" hangingPunct="1"/>
             <a:r>
-              <a:rPr lang="en-ZA" altLang="en-US" sz="3600" b="1" dirty="0" smtClean="0">
+              <a:rPr lang="en-ZA" altLang="en-US" sz="3600" b="1" dirty="0">
                 <a:solidFill>
                   <a:srgbClr val="0070C0"/>
                 </a:solidFill>
@@ -14270,38 +13714,8 @@
                 <a:ea typeface="+mn-ea"/>
                 <a:cs typeface="+mn-cs"/>
               </a:rPr>
-              <a:t>Snowbal</a:t>
-            </a:r>
-            <a:r>
-              <a:rPr lang="en-ZA" altLang="en-US" sz="3600" b="1" dirty="0" smtClean="0">
-                <a:solidFill>
-                  <a:srgbClr val="0070C0"/>
-                </a:solidFill>
-                <a:latin typeface="+mn-lt"/>
-                <a:ea typeface="+mn-ea"/>
-                <a:cs typeface="+mn-cs"/>
-              </a:rPr>
-              <a:t>l </a:t>
-            </a:r>
-            <a:r>
-              <a:rPr lang="en-ZA" altLang="en-US" sz="3600" b="1" dirty="0" smtClean="0">
-                <a:solidFill>
-                  <a:srgbClr val="0070C0"/>
-                </a:solidFill>
-                <a:latin typeface="+mn-lt"/>
-                <a:ea typeface="+mn-ea"/>
-                <a:cs typeface="+mn-cs"/>
-              </a:rPr>
-              <a:t>Sampling</a:t>
-            </a:r>
-            <a:endParaRPr lang="en-ZA" altLang="en-US" sz="3600" b="1" dirty="0">
-              <a:solidFill>
-                <a:srgbClr val="0070C0"/>
-              </a:solidFill>
-              <a:latin typeface="+mn-lt"/>
-              <a:ea typeface="+mn-ea"/>
-              <a:cs typeface="+mn-cs"/>
-            </a:endParaRPr>
+              <a:t>Snowball Sampling</a:t>
+            </a:r>
           </a:p>
         </p:txBody>
       </p:sp>
@@ -14354,7 +13768,7 @@
               <a:t>a sample using networks</a:t>
             </a:r>
             <a:r>
-              <a:rPr lang="en-US" sz="3200" dirty="0" smtClean="0"/>
+              <a:rPr lang="en-US" sz="3200" dirty="0"/>
               <a:t>.</a:t>
             </a:r>
           </a:p>
@@ -14368,20 +13782,8 @@
               </a:spcBef>
             </a:pPr>
             <a:r>
-              <a:rPr lang="en-US" sz="3200" dirty="0" smtClean="0"/>
-              <a:t>To </a:t>
-            </a:r>
-            <a:r>
               <a:rPr lang="en-US" sz="3200" dirty="0"/>
-              <a:t>start with, a few </a:t>
-            </a:r>
-            <a:r>
-              <a:rPr lang="en-US" sz="3200" dirty="0" smtClean="0"/>
-              <a:t>individuals </a:t>
-            </a:r>
-            <a:r>
-              <a:rPr lang="en-US" sz="3200" dirty="0"/>
-              <a:t>in a group or </a:t>
+              <a:t>To start with, a few individuals in a group or </a:t>
             </a:r>
             <a:r>
               <a:rPr lang="en-US" sz="3200" dirty="0" err="1"/>
@@ -14399,7 +13801,6 @@
               <a:rPr lang="en-US" sz="3200" dirty="0"/>
               <a:t>, and the people selected by them become a part of the sample. </a:t>
             </a:r>
-            <a:endParaRPr lang="en-US" sz="3200" dirty="0" smtClean="0"/>
           </a:p>
           <a:p>
             <a:pPr algn="just">
@@ -14454,13 +13855,6 @@
   <p:clrMapOvr>
     <a:masterClrMapping/>
   </p:clrMapOvr>
-  <p:timing>
-    <p:tnLst>
-      <p:par>
-        <p:cTn id="1" dur="indefinite" restart="never" nodeType="tmRoot"/>
-      </p:par>
-    </p:tnLst>
-  </p:timing>
 </p:sld>
 </file>
 
@@ -14511,7 +13905,7 @@
           <a:p>
             <a:pPr eaLnBrk="1" hangingPunct="1"/>
             <a:r>
-              <a:rPr lang="en-ZA" altLang="en-US" sz="3600" b="1" dirty="0" smtClean="0">
+              <a:rPr lang="en-ZA" altLang="en-US" sz="3600" b="1" dirty="0">
                 <a:solidFill>
                   <a:srgbClr val="0070C0"/>
                 </a:solidFill>
@@ -14519,38 +13913,8 @@
                 <a:ea typeface="+mn-ea"/>
                 <a:cs typeface="+mn-cs"/>
               </a:rPr>
-              <a:t>Snowbal</a:t>
-            </a:r>
-            <a:r>
-              <a:rPr lang="en-ZA" altLang="en-US" sz="3600" b="1" dirty="0" smtClean="0">
-                <a:solidFill>
-                  <a:srgbClr val="0070C0"/>
-                </a:solidFill>
-                <a:latin typeface="+mn-lt"/>
-                <a:ea typeface="+mn-ea"/>
-                <a:cs typeface="+mn-cs"/>
-              </a:rPr>
-              <a:t>l </a:t>
-            </a:r>
-            <a:r>
-              <a:rPr lang="en-ZA" altLang="en-US" sz="3600" b="1" dirty="0" smtClean="0">
-                <a:solidFill>
-                  <a:srgbClr val="0070C0"/>
-                </a:solidFill>
-                <a:latin typeface="+mn-lt"/>
-                <a:ea typeface="+mn-ea"/>
-                <a:cs typeface="+mn-cs"/>
-              </a:rPr>
-              <a:t>Sampling…</a:t>
-            </a:r>
-            <a:endParaRPr lang="en-ZA" altLang="en-US" sz="3600" b="1" dirty="0">
-              <a:solidFill>
-                <a:srgbClr val="0070C0"/>
-              </a:solidFill>
-              <a:latin typeface="+mn-lt"/>
-              <a:ea typeface="+mn-ea"/>
-              <a:cs typeface="+mn-cs"/>
-            </a:endParaRPr>
+              <a:t>Snowball Sampling…</a:t>
+            </a:r>
           </a:p>
         </p:txBody>
       </p:sp>
@@ -14590,13 +13954,6 @@
   <p:clrMapOvr>
     <a:masterClrMapping/>
   </p:clrMapOvr>
-  <p:timing>
-    <p:tnLst>
-      <p:par>
-        <p:cTn id="1" dur="indefinite" restart="never" nodeType="tmRoot"/>
-      </p:par>
-    </p:tnLst>
-  </p:timing>
 </p:sld>
 </file>
 
@@ -14647,7 +14004,7 @@
           <a:p>
             <a:pPr eaLnBrk="1" hangingPunct="1"/>
             <a:r>
-              <a:rPr lang="en-ZA" altLang="en-US" sz="3600" b="1" dirty="0" smtClean="0">
+              <a:rPr lang="en-ZA" altLang="en-US" sz="3600" b="1" dirty="0">
                 <a:solidFill>
                   <a:srgbClr val="0070C0"/>
                 </a:solidFill>
@@ -14657,14 +14014,6 @@
               </a:rPr>
               <a:t>7. Sample Size</a:t>
             </a:r>
-            <a:endParaRPr lang="en-ZA" altLang="en-US" sz="3600" b="1" dirty="0">
-              <a:solidFill>
-                <a:srgbClr val="0070C0"/>
-              </a:solidFill>
-              <a:latin typeface="+mn-lt"/>
-              <a:ea typeface="+mn-ea"/>
-              <a:cs typeface="+mn-cs"/>
-            </a:endParaRPr>
           </a:p>
         </p:txBody>
       </p:sp>
@@ -14706,28 +14055,12 @@
               <a:buNone/>
             </a:pPr>
             <a:r>
-              <a:rPr lang="en-US" sz="3200" dirty="0" smtClean="0">
+              <a:rPr lang="en-US" sz="3200" dirty="0">
                 <a:solidFill>
                   <a:srgbClr val="C00000"/>
                 </a:solidFill>
               </a:rPr>
-              <a:t>‘</a:t>
-            </a:r>
-            <a:r>
-              <a:rPr lang="en-US" sz="3200" dirty="0">
-                <a:solidFill>
-                  <a:srgbClr val="C00000"/>
-                </a:solidFill>
-              </a:rPr>
-              <a:t>How big a sample should I select?’, ‘What should be my sample size?’ and ‘How many cases do I need</a:t>
-            </a:r>
-            <a:r>
-              <a:rPr lang="en-US" sz="3200" dirty="0" smtClean="0">
-                <a:solidFill>
-                  <a:srgbClr val="C00000"/>
-                </a:solidFill>
-              </a:rPr>
-              <a:t>?’</a:t>
+              <a:t>‘How big a sample should I select?’, ‘What should be my sample size?’ and ‘How many cases do I need?’</a:t>
             </a:r>
           </a:p>
           <a:p>
@@ -14740,14 +14073,9 @@
               </a:spcBef>
             </a:pPr>
             <a:r>
-              <a:rPr lang="en-US" sz="3200" dirty="0" smtClean="0"/>
-              <a:t>Basically</a:t>
-            </a:r>
-            <a:r>
               <a:rPr lang="en-US" sz="3200" dirty="0"/>
-              <a:t>, it depends on what you want to do with the findings and what type of relationships you want to establish. </a:t>
-            </a:r>
-            <a:endParaRPr lang="en-US" sz="3200" dirty="0" smtClean="0"/>
+              <a:t>Basically, it depends on what you want to do with the findings and what type of relationships you want to establish. </a:t>
+            </a:r>
           </a:p>
           <a:p>
             <a:pPr algn="just">
@@ -14759,12 +14087,8 @@
               </a:spcBef>
             </a:pPr>
             <a:r>
-              <a:rPr lang="en-US" sz="3200" dirty="0" smtClean="0"/>
-              <a:t>Your </a:t>
-            </a:r>
-            <a:r>
               <a:rPr lang="en-US" sz="3200" dirty="0"/>
-              <a:t>purpose in undertaking research is </a:t>
+              <a:t>Your purpose in undertaking research is </a:t>
             </a:r>
             <a:r>
               <a:rPr lang="en-US" sz="3200" dirty="0">
@@ -14776,11 +14100,7 @@
             </a:r>
             <a:r>
               <a:rPr lang="en-US" sz="3200" dirty="0"/>
-              <a:t>, and this level of accuracy is an important determinant of sample </a:t>
-            </a:r>
-            <a:r>
-              <a:rPr lang="en-US" sz="3200" dirty="0" smtClean="0"/>
-              <a:t>size.</a:t>
+              <a:t>, and this level of accuracy is an important determinant of sample size.</a:t>
             </a:r>
             <a:endParaRPr lang="en-GB" sz="3100" dirty="0">
               <a:solidFill>
@@ -14800,13 +14120,6 @@
   <p:clrMapOvr>
     <a:masterClrMapping/>
   </p:clrMapOvr>
-  <p:timing>
-    <p:tnLst>
-      <p:par>
-        <p:cTn id="1" dur="indefinite" restart="never" nodeType="tmRoot"/>
-      </p:par>
-    </p:tnLst>
-  </p:timing>
 </p:sld>
 </file>
 
@@ -14857,7 +14170,7 @@
           <a:p>
             <a:pPr eaLnBrk="1" hangingPunct="1"/>
             <a:r>
-              <a:rPr lang="en-ZA" altLang="en-US" sz="3600" b="1" dirty="0" smtClean="0">
+              <a:rPr lang="en-ZA" altLang="en-US" sz="3600" b="1" dirty="0">
                 <a:solidFill>
                   <a:srgbClr val="0070C0"/>
                 </a:solidFill>
@@ -14867,14 +14180,6 @@
               </a:rPr>
               <a:t>7. Sample Size …</a:t>
             </a:r>
-            <a:endParaRPr lang="en-ZA" altLang="en-US" sz="3600" b="1" dirty="0">
-              <a:solidFill>
-                <a:srgbClr val="0070C0"/>
-              </a:solidFill>
-              <a:latin typeface="+mn-lt"/>
-              <a:ea typeface="+mn-ea"/>
-              <a:cs typeface="+mn-cs"/>
-            </a:endParaRPr>
           </a:p>
         </p:txBody>
       </p:sp>
@@ -14916,11 +14221,7 @@
             </a:pPr>
             <a:r>
               <a:rPr lang="en-ZA" dirty="0"/>
-              <a:t>Sample size is the number of units that need to be surveyed in order for the findings to be precise and </a:t>
-            </a:r>
-            <a:r>
-              <a:rPr lang="en-ZA" dirty="0" smtClean="0"/>
-              <a:t>reliable. </a:t>
+              <a:t>Sample size is the number of units that need to be surveyed in order for the findings to be precise and reliable. </a:t>
             </a:r>
           </a:p>
           <a:p>
@@ -14933,14 +14234,9 @@
               </a:spcBef>
             </a:pPr>
             <a:r>
-              <a:rPr lang="en-ZA" dirty="0" smtClean="0"/>
-              <a:t>The </a:t>
-            </a:r>
-            <a:r>
               <a:rPr lang="en-ZA" dirty="0"/>
-              <a:t>determination of the sample size differs depending on the research design </a:t>
-            </a:r>
-            <a:endParaRPr lang="en-ZA" dirty="0" smtClean="0"/>
+              <a:t>The determination of the sample size differs depending on the research design </a:t>
+            </a:r>
           </a:p>
           <a:p>
             <a:pPr algn="just">
@@ -14952,16 +14248,8 @@
               </a:spcBef>
             </a:pPr>
             <a:r>
-              <a:rPr lang="en-ZA" dirty="0" smtClean="0"/>
-              <a:t>In </a:t>
-            </a:r>
-            <a:r>
               <a:rPr lang="en-ZA" dirty="0"/>
-              <a:t>order to provide the basis for a sound generalisation, the sample size should not be too small. As the sample size increases, the margin of errors decreases for a particular level of </a:t>
-            </a:r>
-            <a:r>
-              <a:rPr lang="en-ZA" dirty="0" smtClean="0"/>
-              <a:t>confidence.</a:t>
+              <a:t>In order to provide the basis for a sound generalisation, the sample size should not be too small. As the sample size increases, the margin of errors decreases for a particular level of confidence.</a:t>
             </a:r>
           </a:p>
           <a:p>
@@ -14974,28 +14262,12 @@
               </a:spcBef>
             </a:pPr>
             <a:r>
-              <a:rPr lang="en-ZA" sz="3100" dirty="0" smtClean="0">
+              <a:rPr lang="en-ZA" sz="3100" dirty="0">
                 <a:solidFill>
                   <a:srgbClr val="C00000"/>
                 </a:solidFill>
               </a:rPr>
-              <a:t>Use statistical formula to calculate sample size </a:t>
-            </a:r>
-            <a:r>
-              <a:rPr lang="en-ZA" sz="3100" dirty="0">
-                <a:solidFill>
-                  <a:srgbClr val="C00000"/>
-                </a:solidFill>
-              </a:rPr>
-              <a:t>or https://www.surveymonkey.com/mp/sample-size-calculator</a:t>
-            </a:r>
-            <a:r>
-              <a:rPr lang="en-ZA" sz="3100" dirty="0" smtClean="0">
-                <a:solidFill>
-                  <a:srgbClr val="C00000"/>
-                </a:solidFill>
-              </a:rPr>
-              <a:t>/</a:t>
+              <a:t>Use statistical formula to calculate sample size or https://www.surveymonkey.com/mp/sample-size-calculator/</a:t>
             </a:r>
             <a:endParaRPr lang="en-GB" sz="3100" dirty="0">
               <a:solidFill>
@@ -15015,13 +14287,6 @@
   <p:clrMapOvr>
     <a:masterClrMapping/>
   </p:clrMapOvr>
-  <p:timing>
-    <p:tnLst>
-      <p:par>
-        <p:cTn id="1" dur="indefinite" restart="never" nodeType="tmRoot"/>
-      </p:par>
-    </p:tnLst>
-  </p:timing>
 </p:sld>
 </file>
 
@@ -15258,13 +14523,6 @@
   <p:clrMapOvr>
     <a:masterClrMapping/>
   </p:clrMapOvr>
-  <p:timing>
-    <p:tnLst>
-      <p:par>
-        <p:cTn id="1" dur="indefinite" restart="never" nodeType="tmRoot"/>
-      </p:par>
-    </p:tnLst>
-  </p:timing>
 </p:sld>
 </file>
 
@@ -15374,17 +14632,8 @@
             </a:pPr>
             <a:r>
               <a:rPr lang="en-GB" altLang="en-US" sz="2400" dirty="0"/>
-              <a:t>E</a:t>
-            </a:r>
-            <a:r>
-              <a:rPr lang="en-GB" altLang="en-US" sz="2400" dirty="0" smtClean="0"/>
-              <a:t>xplain </a:t>
-            </a:r>
-            <a:r>
-              <a:rPr lang="en-GB" altLang="en-US" sz="2400" dirty="0" smtClean="0"/>
-              <a:t>what sampling is.</a:t>
-            </a:r>
-            <a:endParaRPr lang="en-GB" altLang="en-US" sz="2400" dirty="0"/>
+              <a:t>Explain what sampling is.</a:t>
+            </a:r>
           </a:p>
           <a:p>
             <a:pPr marL="457200" indent="-457200">
@@ -15396,17 +14645,8 @@
             </a:pPr>
             <a:r>
               <a:rPr lang="en-GB" altLang="en-US" sz="2400" dirty="0"/>
-              <a:t>D</a:t>
-            </a:r>
-            <a:r>
-              <a:rPr lang="en-GB" altLang="en-US" sz="2400" dirty="0" smtClean="0"/>
-              <a:t>escribe </a:t>
-            </a:r>
-            <a:r>
-              <a:rPr lang="en-GB" altLang="en-US" sz="2400" dirty="0" smtClean="0"/>
-              <a:t>concept of sampling.</a:t>
-            </a:r>
-            <a:endParaRPr lang="en-GB" altLang="en-US" sz="2400" dirty="0"/>
+              <a:t>Describe concept of sampling.</a:t>
+            </a:r>
           </a:p>
           <a:p>
             <a:pPr marL="457200" lvl="0" indent="-457200">
@@ -15417,14 +14657,10 @@
               <a:buAutoNum type="arabicPeriod"/>
             </a:pPr>
             <a:r>
-              <a:rPr lang="en-GB" altLang="en-US" sz="2400" dirty="0" smtClean="0"/>
-              <a:t>Describe  </a:t>
-            </a:r>
-            <a:r>
-              <a:rPr lang="en-GB" altLang="en-US" sz="2400" dirty="0" smtClean="0"/>
-              <a:t>sampling terminology.</a:t>
-            </a:r>
-            <a:endParaRPr lang="en-GB" sz="2400" dirty="0" smtClean="0"/>
+              <a:rPr lang="en-GB" altLang="en-US" sz="2400" dirty="0"/>
+              <a:t>Describe  sampling terminology.</a:t>
+            </a:r>
+            <a:endParaRPr lang="en-GB" sz="2400" dirty="0"/>
           </a:p>
           <a:p>
             <a:pPr marL="457200" lvl="0" indent="-457200">
@@ -15435,7 +14671,7 @@
               <a:buAutoNum type="arabicPeriod"/>
             </a:pPr>
             <a:r>
-              <a:rPr lang="en-GB" sz="2400" dirty="0" smtClean="0"/>
+              <a:rPr lang="en-GB" sz="2400" dirty="0"/>
               <a:t>Explain sampling techniques.</a:t>
             </a:r>
           </a:p>
@@ -15448,7 +14684,7 @@
               <a:buAutoNum type="arabicPeriod"/>
             </a:pPr>
             <a:r>
-              <a:rPr lang="en-GB" sz="2400" dirty="0" smtClean="0"/>
+              <a:rPr lang="en-GB" sz="2400" dirty="0"/>
               <a:t>Explain probability sampling.</a:t>
             </a:r>
           </a:p>
@@ -15461,7 +14697,7 @@
               <a:buAutoNum type="arabicPeriod"/>
             </a:pPr>
             <a:r>
-              <a:rPr lang="en-GB" sz="2400" dirty="0" smtClean="0"/>
+              <a:rPr lang="en-GB" sz="2400" dirty="0"/>
               <a:t>Explain non-probability sampling.</a:t>
             </a:r>
           </a:p>
@@ -15474,7 +14710,7 @@
               <a:buAutoNum type="arabicPeriod"/>
             </a:pPr>
             <a:r>
-              <a:rPr lang="en-GB" sz="2400" dirty="0" smtClean="0"/>
+              <a:rPr lang="en-GB" sz="2400" dirty="0"/>
               <a:t>Describe sample size.</a:t>
             </a:r>
           </a:p>
@@ -15486,7 +14722,7 @@
               <a:buFont typeface="+mj-lt"/>
               <a:buAutoNum type="arabicPeriod"/>
             </a:pPr>
-            <a:endParaRPr lang="en-GB" sz="2400" dirty="0" smtClean="0"/>
+            <a:endParaRPr lang="en-GB" sz="2400" dirty="0"/>
           </a:p>
           <a:p>
             <a:pPr marL="457200" lvl="0" indent="-457200">
@@ -15496,7 +14732,7 @@
               <a:buFont typeface="+mj-lt"/>
               <a:buAutoNum type="arabicPeriod"/>
             </a:pPr>
-            <a:endParaRPr lang="en-GB" sz="2400" dirty="0" smtClean="0"/>
+            <a:endParaRPr lang="en-GB" sz="2400" dirty="0"/>
           </a:p>
           <a:p>
             <a:pPr marL="457200" lvl="0" indent="-457200">
@@ -15506,7 +14742,7 @@
               <a:buFont typeface="+mj-lt"/>
               <a:buAutoNum type="arabicPeriod"/>
             </a:pPr>
-            <a:endParaRPr lang="en-GB" dirty="0" smtClean="0"/>
+            <a:endParaRPr lang="en-GB" dirty="0"/>
           </a:p>
           <a:p>
             <a:pPr marL="457200" lvl="0" indent="-457200">
@@ -15526,7 +14762,7 @@
               <a:buFont typeface="+mj-lt"/>
               <a:buAutoNum type="arabicPeriod"/>
             </a:pPr>
-            <a:endParaRPr lang="en-GB" dirty="0" smtClean="0"/>
+            <a:endParaRPr lang="en-GB" dirty="0"/>
           </a:p>
           <a:p>
             <a:pPr marL="457200" lvl="0" indent="-457200">
@@ -15567,13 +14803,6 @@
   <p:clrMapOvr>
     <a:masterClrMapping/>
   </p:clrMapOvr>
-  <p:timing>
-    <p:tnLst>
-      <p:par>
-        <p:cTn id="1" dur="indefinite" restart="never" nodeType="tmRoot"/>
-      </p:par>
-    </p:tnLst>
-  </p:timing>
 </p:sld>
 </file>
 
@@ -15619,7 +14848,7 @@
           <a:p>
             <a:pPr eaLnBrk="1" hangingPunct="1"/>
             <a:r>
-              <a:rPr lang="en-ZA" altLang="en-US" sz="2800" b="1" dirty="0" smtClean="0">
+              <a:rPr lang="en-ZA" altLang="en-US" sz="2800" b="1" dirty="0">
                 <a:solidFill>
                   <a:srgbClr val="0070C0"/>
                 </a:solidFill>
@@ -15629,14 +14858,6 @@
               </a:rPr>
               <a:t>LEARNING UNIT 2 ASSESSMENT CRITERIA </a:t>
             </a:r>
-            <a:endParaRPr lang="en-ZA" altLang="en-US" sz="2800" b="1" dirty="0">
-              <a:solidFill>
-                <a:srgbClr val="0070C0"/>
-              </a:solidFill>
-              <a:latin typeface="+mn-lt"/>
-              <a:ea typeface="+mn-ea"/>
-              <a:cs typeface="+mn-cs"/>
-            </a:endParaRPr>
           </a:p>
         </p:txBody>
       </p:sp>
@@ -15685,12 +14906,8 @@
               <a:buAutoNum type="arabicPeriod"/>
             </a:pPr>
             <a:r>
-              <a:rPr lang="en-GB" altLang="en-US" dirty="0" smtClean="0"/>
-              <a:t>Understood what </a:t>
-            </a:r>
-            <a:r>
               <a:rPr lang="en-GB" altLang="en-US" dirty="0"/>
-              <a:t>sampling is.</a:t>
+              <a:t>Understood what sampling is.</a:t>
             </a:r>
           </a:p>
           <a:p>
@@ -15702,12 +14919,8 @@
               <a:buAutoNum type="arabicPeriod"/>
             </a:pPr>
             <a:r>
-              <a:rPr lang="en-GB" altLang="en-US" dirty="0" smtClean="0"/>
-              <a:t>Understood concept </a:t>
-            </a:r>
-            <a:r>
               <a:rPr lang="en-GB" altLang="en-US" dirty="0"/>
-              <a:t>of sampling.</a:t>
+              <a:t>Understood concept of sampling.</a:t>
             </a:r>
           </a:p>
           <a:p>
@@ -15719,12 +14932,8 @@
               <a:buAutoNum type="arabicPeriod"/>
             </a:pPr>
             <a:r>
-              <a:rPr lang="en-GB" altLang="en-US" dirty="0" smtClean="0"/>
-              <a:t>Understood sampling </a:t>
-            </a:r>
-            <a:r>
               <a:rPr lang="en-GB" altLang="en-US" dirty="0"/>
-              <a:t>terminology.</a:t>
+              <a:t>Understood sampling terminology.</a:t>
             </a:r>
             <a:endParaRPr lang="en-GB" dirty="0"/>
           </a:p>
@@ -15737,12 +14946,8 @@
               <a:buAutoNum type="arabicPeriod"/>
             </a:pPr>
             <a:r>
-              <a:rPr lang="en-GB" dirty="0" smtClean="0"/>
-              <a:t>Understood </a:t>
-            </a:r>
-            <a:r>
               <a:rPr lang="en-GB" dirty="0"/>
-              <a:t>sampling techniques.</a:t>
+              <a:t>Understood sampling techniques.</a:t>
             </a:r>
           </a:p>
           <a:p>
@@ -15754,12 +14959,8 @@
               <a:buAutoNum type="arabicPeriod"/>
             </a:pPr>
             <a:r>
-              <a:rPr lang="en-GB" dirty="0" smtClean="0"/>
-              <a:t>Understood </a:t>
-            </a:r>
-            <a:r>
               <a:rPr lang="en-GB" dirty="0"/>
-              <a:t>probability sampling.</a:t>
+              <a:t>Understood probability sampling.</a:t>
             </a:r>
           </a:p>
           <a:p>
@@ -15771,12 +14972,8 @@
               <a:buAutoNum type="arabicPeriod"/>
             </a:pPr>
             <a:r>
-              <a:rPr lang="en-GB" dirty="0" smtClean="0"/>
-              <a:t>Understood </a:t>
-            </a:r>
-            <a:r>
               <a:rPr lang="en-GB" dirty="0"/>
-              <a:t>non-probability sampling.</a:t>
+              <a:t>Understood non-probability sampling.</a:t>
             </a:r>
           </a:p>
           <a:p>
@@ -15788,12 +14985,8 @@
               <a:buAutoNum type="arabicPeriod"/>
             </a:pPr>
             <a:r>
-              <a:rPr lang="en-GB" dirty="0" smtClean="0"/>
-              <a:t>Understood </a:t>
-            </a:r>
-            <a:r>
               <a:rPr lang="en-GB" dirty="0"/>
-              <a:t>sample size.</a:t>
+              <a:t>Understood sample size.</a:t>
             </a:r>
           </a:p>
           <a:p>
@@ -15813,7 +15006,7 @@
               <a:buFont typeface="+mj-lt"/>
               <a:buAutoNum type="arabicPeriod"/>
             </a:pPr>
-            <a:endParaRPr lang="en-GB" dirty="0" smtClean="0"/>
+            <a:endParaRPr lang="en-GB" dirty="0"/>
           </a:p>
           <a:p>
             <a:pPr marL="457200" lvl="0" indent="-457200">
@@ -15854,13 +15047,6 @@
   <p:clrMapOvr>
     <a:masterClrMapping/>
   </p:clrMapOvr>
-  <p:timing>
-    <p:tnLst>
-      <p:par>
-        <p:cTn id="1" dur="indefinite" restart="never" nodeType="tmRoot"/>
-      </p:par>
-    </p:tnLst>
-  </p:timing>
 </p:sld>
 </file>
 
@@ -15911,7 +15097,7 @@
           <a:p>
             <a:pPr eaLnBrk="1" hangingPunct="1"/>
             <a:r>
-              <a:rPr lang="en-ZA" altLang="en-US" sz="3600" b="1" dirty="0" smtClean="0">
+              <a:rPr lang="en-ZA" altLang="en-US" sz="3600" b="1" dirty="0">
                 <a:solidFill>
                   <a:srgbClr val="0070C0"/>
                 </a:solidFill>
@@ -15921,14 +15107,6 @@
               </a:rPr>
               <a:t>1.  What is Sampling?</a:t>
             </a:r>
-            <a:endParaRPr lang="en-ZA" altLang="en-US" sz="3600" b="1" dirty="0">
-              <a:solidFill>
-                <a:srgbClr val="0070C0"/>
-              </a:solidFill>
-              <a:latin typeface="+mn-lt"/>
-              <a:ea typeface="+mn-ea"/>
-              <a:cs typeface="+mn-cs"/>
-            </a:endParaRPr>
           </a:p>
         </p:txBody>
       </p:sp>
@@ -15969,12 +15147,8 @@
               </a:spcBef>
             </a:pPr>
             <a:r>
-              <a:rPr lang="en-US" sz="4000" dirty="0" smtClean="0"/>
-              <a:t>Sampling is </a:t>
-            </a:r>
-            <a:r>
               <a:rPr lang="en-US" sz="4000" dirty="0"/>
-              <a:t>the </a:t>
+              <a:t>Sampling is the </a:t>
             </a:r>
             <a:r>
               <a:rPr lang="en-US" sz="4000" dirty="0">
@@ -15988,7 +15162,6 @@
               <a:rPr lang="en-US" sz="4000" dirty="0"/>
               <a:t> to become the basis for estimating or predicting the prevalence of an unknown piece of information, situation or outcome regarding the bigger group. </a:t>
             </a:r>
-            <a:endParaRPr lang="en-US" sz="4000" dirty="0" smtClean="0"/>
           </a:p>
           <a:p>
             <a:pPr algn="just">
@@ -16000,7 +15173,7 @@
               </a:spcBef>
             </a:pPr>
             <a:r>
-              <a:rPr lang="en-US" sz="4000" dirty="0" smtClean="0"/>
+              <a:rPr lang="en-US" sz="4000" dirty="0"/>
               <a:t>A </a:t>
             </a:r>
             <a:r>
@@ -16015,7 +15188,7 @@
               <a:rPr lang="en-US" sz="4000" dirty="0"/>
               <a:t>is a subgroup of the population you are interested in. </a:t>
             </a:r>
-            <a:endParaRPr lang="en-GB" sz="3800" dirty="0" smtClean="0"/>
+            <a:endParaRPr lang="en-GB" sz="3800" dirty="0"/>
           </a:p>
           <a:p>
             <a:pPr algn="just">
@@ -16057,13 +15230,6 @@
   <p:clrMapOvr>
     <a:masterClrMapping/>
   </p:clrMapOvr>
-  <p:timing>
-    <p:tnLst>
-      <p:par>
-        <p:cTn id="1" dur="indefinite" restart="never" nodeType="tmRoot"/>
-      </p:par>
-    </p:tnLst>
-  </p:timing>
 </p:sld>
 </file>
 
@@ -16114,7 +15280,7 @@
           <a:p>
             <a:pPr eaLnBrk="1" hangingPunct="1"/>
             <a:r>
-              <a:rPr lang="en-ZA" altLang="en-US" sz="3600" b="1" dirty="0" smtClean="0">
+              <a:rPr lang="en-ZA" altLang="en-US" sz="3600" b="1" dirty="0">
                 <a:solidFill>
                   <a:srgbClr val="0070C0"/>
                 </a:solidFill>
@@ -16124,14 +15290,6 @@
               </a:rPr>
               <a:t>2. Concept of Sampling</a:t>
             </a:r>
-            <a:endParaRPr lang="en-ZA" altLang="en-US" sz="3600" b="1" dirty="0">
-              <a:solidFill>
-                <a:srgbClr val="0070C0"/>
-              </a:solidFill>
-              <a:latin typeface="+mn-lt"/>
-              <a:ea typeface="+mn-ea"/>
-              <a:cs typeface="+mn-cs"/>
-            </a:endParaRPr>
           </a:p>
         </p:txBody>
       </p:sp>
@@ -16209,7 +15367,7 @@
         </p:blipFill>
         <p:spPr>
           <a:xfrm>
-            <a:off x="238125" y="1309686"/>
+            <a:off x="238125" y="1299854"/>
             <a:ext cx="10777538" cy="5262917"/>
           </a:xfrm>
           <a:prstGeom prst="rect">
@@ -16227,13 +15385,6 @@
   <p:clrMapOvr>
     <a:masterClrMapping/>
   </p:clrMapOvr>
-  <p:timing>
-    <p:tnLst>
-      <p:par>
-        <p:cTn id="1" dur="indefinite" restart="never" nodeType="tmRoot"/>
-      </p:par>
-    </p:tnLst>
-  </p:timing>
 </p:sld>
 </file>
 
@@ -16292,27 +15443,8 @@
                 <a:ea typeface="+mn-ea"/>
                 <a:cs typeface="+mn-cs"/>
               </a:rPr>
-              <a:t>2</a:t>
-            </a:r>
-            <a:r>
-              <a:rPr lang="en-ZA" altLang="en-US" sz="3600" b="1" dirty="0" smtClean="0">
-                <a:solidFill>
-                  <a:srgbClr val="0070C0"/>
-                </a:solidFill>
-                <a:latin typeface="+mn-lt"/>
-                <a:ea typeface="+mn-ea"/>
-                <a:cs typeface="+mn-cs"/>
-              </a:rPr>
-              <a:t>. Concept of Sampling …</a:t>
-            </a:r>
-            <a:endParaRPr lang="en-ZA" altLang="en-US" sz="3600" b="1" dirty="0">
-              <a:solidFill>
-                <a:srgbClr val="0070C0"/>
-              </a:solidFill>
-              <a:latin typeface="+mn-lt"/>
-              <a:ea typeface="+mn-ea"/>
-              <a:cs typeface="+mn-cs"/>
-            </a:endParaRPr>
+              <a:t>2. Concept of Sampling …</a:t>
+            </a:r>
           </a:p>
         </p:txBody>
       </p:sp>
@@ -16351,11 +15483,7 @@
             </a:pPr>
             <a:r>
               <a:rPr lang="en-US" sz="3600" dirty="0"/>
-              <a:t>Let us take a very simple example to explain the concept of </a:t>
-            </a:r>
-            <a:r>
-              <a:rPr lang="en-US" sz="3600" dirty="0" smtClean="0"/>
-              <a:t>sampling in quantitative research. </a:t>
+              <a:t>Let us take a very simple example to explain the concept of sampling in quantitative research. </a:t>
             </a:r>
           </a:p>
           <a:p>
@@ -16366,12 +15494,8 @@
               <a:buNone/>
             </a:pPr>
             <a:r>
-              <a:rPr lang="en-US" sz="3600" dirty="0" smtClean="0"/>
-              <a:t>    Example, suppose </a:t>
-            </a:r>
-            <a:r>
               <a:rPr lang="en-US" sz="3600" dirty="0"/>
-              <a:t>you want to estimate the </a:t>
+              <a:t>    Example, suppose you want to estimate the </a:t>
             </a:r>
             <a:r>
               <a:rPr lang="en-US" sz="3600" dirty="0">
@@ -16379,15 +15503,7 @@
                   <a:srgbClr val="C00000"/>
                 </a:solidFill>
               </a:rPr>
-              <a:t>average age of the </a:t>
-            </a:r>
-            <a:r>
-              <a:rPr lang="en-US" sz="3600" dirty="0" smtClean="0">
-                <a:solidFill>
-                  <a:srgbClr val="C00000"/>
-                </a:solidFill>
-              </a:rPr>
-              <a:t>  </a:t>
+              <a:t>average age of the   </a:t>
             </a:r>
           </a:p>
           <a:p>
@@ -16403,34 +15519,10 @@
                   <a:srgbClr val="C00000"/>
                 </a:solidFill>
               </a:rPr>
-              <a:t> </a:t>
-            </a:r>
-            <a:r>
-              <a:rPr lang="en-US" sz="3600" dirty="0" smtClean="0">
-                <a:solidFill>
-                  <a:srgbClr val="C00000"/>
-                </a:solidFill>
-              </a:rPr>
-              <a:t>   students </a:t>
-            </a:r>
-            <a:r>
-              <a:rPr lang="en-US" sz="3600" dirty="0">
-                <a:solidFill>
-                  <a:srgbClr val="C00000"/>
-                </a:solidFill>
-              </a:rPr>
-              <a:t>in your </a:t>
-            </a:r>
-            <a:r>
-              <a:rPr lang="en-US" sz="3600" dirty="0" smtClean="0">
-                <a:solidFill>
-                  <a:srgbClr val="C00000"/>
-                </a:solidFill>
-              </a:rPr>
-              <a:t>class (Cohort 4)</a:t>
-            </a:r>
-            <a:r>
-              <a:rPr lang="en-US" sz="3600" dirty="0" smtClean="0"/>
+              <a:t>    students in your class (Cohort 4)</a:t>
+            </a:r>
+            <a:r>
+              <a:rPr lang="en-US" sz="3600" dirty="0"/>
               <a:t>. </a:t>
             </a:r>
           </a:p>
@@ -16441,16 +15533,8 @@
               </a:lnSpc>
             </a:pPr>
             <a:r>
-              <a:rPr lang="en-US" sz="3600" dirty="0" smtClean="0"/>
-              <a:t>There </a:t>
-            </a:r>
-            <a:r>
               <a:rPr lang="en-US" sz="3600" dirty="0"/>
-              <a:t>are two ways of doing </a:t>
-            </a:r>
-            <a:r>
-              <a:rPr lang="en-US" sz="3600" dirty="0" smtClean="0"/>
-              <a:t>this:</a:t>
+              <a:t>There are two ways of doing this:</a:t>
             </a:r>
           </a:p>
           <a:p>
@@ -16461,10 +15545,10 @@
               <a:buNone/>
             </a:pPr>
             <a:r>
-              <a:rPr lang="en-US" sz="3600" dirty="0" smtClean="0"/>
+              <a:rPr lang="en-US" sz="3600" dirty="0"/>
               <a:t> </a:t>
             </a:r>
-            <a:endParaRPr lang="en-GB" sz="3800" dirty="0" smtClean="0"/>
+            <a:endParaRPr lang="en-GB" sz="3800" dirty="0"/>
           </a:p>
           <a:p>
             <a:pPr algn="just">
@@ -16506,13 +15590,6 @@
   <p:clrMapOvr>
     <a:masterClrMapping/>
   </p:clrMapOvr>
-  <p:timing>
-    <p:tnLst>
-      <p:par>
-        <p:cTn id="1" dur="indefinite" restart="never" nodeType="tmRoot"/>
-      </p:par>
-    </p:tnLst>
-  </p:timing>
 </p:sld>
 </file>
 
@@ -16571,38 +15648,8 @@
                 <a:ea typeface="+mn-ea"/>
                 <a:cs typeface="+mn-cs"/>
               </a:rPr>
-              <a:t>2</a:t>
-            </a:r>
-            <a:r>
-              <a:rPr lang="en-ZA" altLang="en-US" sz="3600" b="1" dirty="0" smtClean="0">
-                <a:solidFill>
-                  <a:srgbClr val="0070C0"/>
-                </a:solidFill>
-                <a:latin typeface="+mn-lt"/>
-                <a:ea typeface="+mn-ea"/>
-                <a:cs typeface="+mn-cs"/>
-              </a:rPr>
-              <a:t>. </a:t>
-            </a:r>
-            <a:r>
-              <a:rPr lang="en-ZA" altLang="en-US" sz="3600" b="1" dirty="0" smtClean="0">
-                <a:solidFill>
-                  <a:srgbClr val="0070C0"/>
-                </a:solidFill>
-                <a:latin typeface="+mn-lt"/>
-                <a:ea typeface="+mn-ea"/>
-                <a:cs typeface="+mn-cs"/>
-              </a:rPr>
-              <a:t>Concept of Sampling …</a:t>
-            </a:r>
-            <a:endParaRPr lang="en-ZA" altLang="en-US" sz="3600" b="1" dirty="0">
-              <a:solidFill>
-                <a:srgbClr val="0070C0"/>
-              </a:solidFill>
-              <a:latin typeface="+mn-lt"/>
-              <a:ea typeface="+mn-ea"/>
-              <a:cs typeface="+mn-cs"/>
-            </a:endParaRPr>
+              <a:t>2. Concept of Sampling …</a:t>
+            </a:r>
           </a:p>
         </p:txBody>
       </p:sp>
@@ -16654,11 +15701,7 @@
             </a:r>
             <a:r>
               <a:rPr lang="en-US" sz="3600" dirty="0"/>
-              <a:t>(the procedure for calculating an average</a:t>
-            </a:r>
-            <a:r>
-              <a:rPr lang="en-US" sz="3600" dirty="0" smtClean="0"/>
-              <a:t>).</a:t>
+              <a:t>(the procedure for calculating an average).</a:t>
             </a:r>
             <a:endParaRPr lang="en-GB" sz="3800" dirty="0"/>
           </a:p>
@@ -16670,12 +15713,8 @@
               <a:buNone/>
             </a:pPr>
             <a:r>
-              <a:rPr lang="en-US" sz="3600" dirty="0" smtClean="0"/>
-              <a:t>2</a:t>
-            </a:r>
-            <a:r>
               <a:rPr lang="en-US" sz="3600" dirty="0"/>
-              <a:t>. The second method is </a:t>
+              <a:t>2. The second method is </a:t>
             </a:r>
             <a:r>
               <a:rPr lang="en-US" sz="3600" dirty="0">
@@ -16683,15 +15722,7 @@
                   <a:srgbClr val="C00000"/>
                 </a:solidFill>
               </a:rPr>
-              <a:t>to select a few students from the class, ask them their ages, add them up and then divide by the number of students you have </a:t>
-            </a:r>
-            <a:r>
-              <a:rPr lang="en-US" sz="3600" dirty="0" smtClean="0">
-                <a:solidFill>
-                  <a:srgbClr val="C00000"/>
-                </a:solidFill>
-              </a:rPr>
-              <a:t>asked.</a:t>
+              <a:t>to select a few students from the class, ask them their ages, add them up and then divide by the number of students you have asked.</a:t>
             </a:r>
           </a:p>
           <a:p>
@@ -16701,7 +15732,7 @@
               </a:lnSpc>
               <a:buNone/>
             </a:pPr>
-            <a:endParaRPr lang="en-GB" sz="3800" dirty="0" smtClean="0">
+            <a:endParaRPr lang="en-GB" sz="3800" dirty="0">
               <a:solidFill>
                 <a:srgbClr val="C00000"/>
               </a:solidFill>
@@ -16747,13 +15778,6 @@
   <p:clrMapOvr>
     <a:masterClrMapping/>
   </p:clrMapOvr>
-  <p:timing>
-    <p:tnLst>
-      <p:par>
-        <p:cTn id="1" dur="indefinite" restart="never" nodeType="tmRoot"/>
-      </p:par>
-    </p:tnLst>
-  </p:timing>
 </p:sld>
 </file>
 
@@ -16804,7 +15828,7 @@
           <a:p>
             <a:pPr eaLnBrk="1" hangingPunct="1"/>
             <a:r>
-              <a:rPr lang="en-ZA" altLang="en-US" sz="3600" b="1" dirty="0" smtClean="0">
+              <a:rPr lang="en-ZA" altLang="en-US" sz="3600" b="1" dirty="0">
                 <a:solidFill>
                   <a:srgbClr val="0070C0"/>
                 </a:solidFill>
@@ -16814,14 +15838,6 @@
               </a:rPr>
               <a:t>2. Concept of Sampling …</a:t>
             </a:r>
-            <a:endParaRPr lang="en-ZA" altLang="en-US" sz="3600" b="1" dirty="0">
-              <a:solidFill>
-                <a:srgbClr val="0070C0"/>
-              </a:solidFill>
-              <a:latin typeface="+mn-lt"/>
-              <a:ea typeface="+mn-ea"/>
-              <a:cs typeface="+mn-cs"/>
-            </a:endParaRPr>
           </a:p>
         </p:txBody>
       </p:sp>
@@ -16862,7 +15878,6 @@
               <a:rPr lang="en-US" sz="3600" dirty="0"/>
               <a:t>This process of selecting a sample from the total population has advantages and disadvantages. </a:t>
             </a:r>
-            <a:endParaRPr lang="en-US" sz="3600" dirty="0" smtClean="0"/>
           </a:p>
           <a:p>
             <a:pPr algn="just">
@@ -16871,12 +15886,8 @@
               </a:lnSpc>
             </a:pPr>
             <a:r>
-              <a:rPr lang="en-US" sz="3600" dirty="0" smtClean="0"/>
-              <a:t>The </a:t>
-            </a:r>
-            <a:r>
               <a:rPr lang="en-US" sz="3600" dirty="0"/>
-              <a:t>advantages are </a:t>
+              <a:t>The advantages are </a:t>
             </a:r>
             <a:r>
               <a:rPr lang="en-US" sz="3600" dirty="0">
@@ -16890,7 +15901,6 @@
               <a:rPr lang="en-US" sz="3600" dirty="0"/>
               <a:t> </a:t>
             </a:r>
-            <a:endParaRPr lang="en-US" sz="3600" dirty="0" smtClean="0"/>
           </a:p>
           <a:p>
             <a:pPr algn="just">
@@ -16899,20 +15909,8 @@
               </a:lnSpc>
             </a:pPr>
             <a:r>
-              <a:rPr lang="en-US" sz="3600" dirty="0" smtClean="0"/>
-              <a:t>However</a:t>
-            </a:r>
-            <a:r>
               <a:rPr lang="en-US" sz="3600" dirty="0"/>
-              <a:t>, the </a:t>
-            </a:r>
-            <a:r>
-              <a:rPr lang="en-US" sz="3600" dirty="0" smtClean="0"/>
-              <a:t>disadvantage </a:t>
-            </a:r>
-            <a:r>
-              <a:rPr lang="en-US" sz="3600" dirty="0"/>
-              <a:t>is that you do not find out the information about the </a:t>
+              <a:t>However, the disadvantage is that you do not find out the information about the </a:t>
             </a:r>
             <a:r>
               <a:rPr lang="en-US" sz="3600" dirty="0">
@@ -16924,11 +15922,7 @@
             </a:r>
             <a:r>
               <a:rPr lang="en-US" sz="3600" dirty="0"/>
-              <a:t>to you but only estimate or predict </a:t>
-            </a:r>
-            <a:r>
-              <a:rPr lang="en-US" sz="3600" dirty="0" smtClean="0"/>
-              <a:t>them. </a:t>
+              <a:t>to you but only estimate or predict them. </a:t>
             </a:r>
             <a:r>
               <a:rPr lang="en-US" sz="4000" dirty="0">
@@ -16936,17 +15930,9 @@
                   <a:srgbClr val="C00000"/>
                 </a:solidFill>
               </a:rPr>
-              <a:t>Hence, the possibility of an error in your estimation </a:t>
-            </a:r>
-            <a:r>
-              <a:rPr lang="en-US" sz="4000" dirty="0" smtClean="0">
-                <a:solidFill>
-                  <a:srgbClr val="C00000"/>
-                </a:solidFill>
-              </a:rPr>
-              <a:t>exists.</a:t>
-            </a:r>
-            <a:endParaRPr lang="en-GB" sz="3800" dirty="0" smtClean="0">
+              <a:t>Hence, the possibility of an error in your estimation exists.</a:t>
+            </a:r>
+            <a:endParaRPr lang="en-GB" sz="3800" dirty="0">
               <a:solidFill>
                 <a:srgbClr val="C00000"/>
               </a:solidFill>
@@ -16992,13 +15978,6 @@
   <p:clrMapOvr>
     <a:masterClrMapping/>
   </p:clrMapOvr>
-  <p:timing>
-    <p:tnLst>
-      <p:par>
-        <p:cTn id="1" dur="indefinite" restart="never" nodeType="tmRoot"/>
-      </p:par>
-    </p:tnLst>
-  </p:timing>
 </p:sld>
 </file>
 

</xml_diff>